<commit_message>
presentation & updated readme
</commit_message>
<xml_diff>
--- a/presentation-materials/PokemonPresentation.pptx
+++ b/presentation-materials/PokemonPresentation.pptx
@@ -206,7 +206,7 @@
           <a:p>
             <a:fld id="{5F136C16-B599-488C-9987-9DF9EBD8430E}" type="datetimeFigureOut">
               <a:rPr lang="en-AU" smtClean="0"/>
-              <a:t>22/08/2020</a:t>
+              <a:t>29/08/2020</a:t>
             </a:fld>
             <a:endParaRPr lang="en-AU"/>
           </a:p>
@@ -518,6 +518,109 @@
           <a:bodyPr/>
           <a:lstStyle/>
           <a:p>
+            <a:r>
+              <a:rPr lang="en-US" b="0" i="0" dirty="0">
+                <a:solidFill>
+                  <a:srgbClr val="1D1C1D"/>
+                </a:solidFill>
+                <a:effectLst/>
+                <a:latin typeface="Slack-Lato"/>
+              </a:rPr>
+              <a:t>Tired of dating so many people you could fill a </a:t>
+            </a:r>
+            <a:r>
+              <a:rPr lang="en-US" b="0" i="0" dirty="0" err="1">
+                <a:solidFill>
+                  <a:srgbClr val="1D1C1D"/>
+                </a:solidFill>
+                <a:effectLst/>
+                <a:latin typeface="Slack-Lato"/>
+              </a:rPr>
+              <a:t>Poxédex</a:t>
+            </a:r>
+            <a:r>
+              <a:rPr lang="en-US" b="0" i="0" dirty="0">
+                <a:solidFill>
+                  <a:srgbClr val="1D1C1D"/>
+                </a:solidFill>
+                <a:effectLst/>
+                <a:latin typeface="Slack-Lato"/>
+              </a:rPr>
+              <a:t>? Ever wanted more certainty when it came to choosing a potential partner? Do you ever reminisce on those nostalgic childhood moments where Pokémon cards, Pokémon Nintendo games and Pokémon tv episodes were the </a:t>
+            </a:r>
+            <a:r>
+              <a:rPr lang="en-US" b="0" i="0" dirty="0" err="1">
+                <a:solidFill>
+                  <a:srgbClr val="1D1C1D"/>
+                </a:solidFill>
+                <a:effectLst/>
+                <a:latin typeface="Slack-Lato"/>
+              </a:rPr>
+              <a:t>centre</a:t>
+            </a:r>
+            <a:r>
+              <a:rPr lang="en-US" b="0" i="0" dirty="0">
+                <a:solidFill>
+                  <a:srgbClr val="1D1C1D"/>
+                </a:solidFill>
+                <a:effectLst/>
+                <a:latin typeface="Slack-Lato"/>
+              </a:rPr>
+              <a:t> of your universe? Traditional API’s will give you a match %, but what does that even mean? Where’s the cut-off, and as a Pokémon fan, how can I relate to that?</a:t>
+            </a:r>
+            <a:br>
+              <a:rPr lang="en-US" dirty="0"/>
+            </a:br>
+            <a:r>
+              <a:rPr lang="en-US" b="0" i="0" dirty="0">
+                <a:solidFill>
+                  <a:srgbClr val="1D1C1D"/>
+                </a:solidFill>
+                <a:effectLst/>
+                <a:latin typeface="Slack-Lato"/>
+              </a:rPr>
+              <a:t>What if I told you that we can relive that feeling of nostalgia in order to help you decide who should be the </a:t>
+            </a:r>
+            <a:r>
+              <a:rPr lang="en-US" b="0" i="0" dirty="0" err="1">
+                <a:solidFill>
+                  <a:srgbClr val="1D1C1D"/>
+                </a:solidFill>
+                <a:effectLst/>
+                <a:latin typeface="Slack-Lato"/>
+              </a:rPr>
+              <a:t>centre</a:t>
+            </a:r>
+            <a:r>
+              <a:rPr lang="en-US" b="0" i="0" dirty="0">
+                <a:solidFill>
+                  <a:srgbClr val="1D1C1D"/>
+                </a:solidFill>
+                <a:effectLst/>
+                <a:latin typeface="Slack-Lato"/>
+              </a:rPr>
+              <a:t> of your universe in today’s times. Thanks to Professor Oak’s Pokémon Love Calculator, you now have the possibility of getting a love compatibility rating for you and your potential partner, and based on that rating, you will be assigned a Pokémon that best describes your relationship outlook with that person. Is your love compatibility electric like Pikachu, or will it struggle to evolve into something strong like </a:t>
+            </a:r>
+            <a:r>
+              <a:rPr lang="en-US" b="0" i="0" dirty="0" err="1">
+                <a:solidFill>
+                  <a:srgbClr val="1D1C1D"/>
+                </a:solidFill>
+                <a:effectLst/>
+                <a:latin typeface="Slack-Lato"/>
+              </a:rPr>
+              <a:t>Magikarp</a:t>
+            </a:r>
+            <a:r>
+              <a:rPr lang="en-US" b="0" i="0" dirty="0">
+                <a:solidFill>
+                  <a:srgbClr val="1D1C1D"/>
+                </a:solidFill>
+                <a:effectLst/>
+                <a:latin typeface="Slack-Lato"/>
+              </a:rPr>
+              <a:t>? Thanks to Professor Oak’s Pokémon Love calculator, you don’t have to catch them all to find the right catch!</a:t>
+            </a:r>
             <a:endParaRPr lang="en-AU" dirty="0"/>
           </a:p>
         </p:txBody>
@@ -1025,30 +1128,6 @@
           <a:bodyPr/>
           <a:lstStyle/>
           <a:p>
-            <a:r>
-              <a:rPr lang="en-US" dirty="0">
-                <a:latin typeface="Arial" panose="020B0604020202020204" pitchFamily="34" charset="0"/>
-                <a:cs typeface="Arial" panose="020B0604020202020204" pitchFamily="34" charset="0"/>
-              </a:rPr>
-              <a:t>The app can be extended to include a search for other users in their town to find partners with love of Pokémon. Would incorporate dating app technology.</a:t>
-            </a:r>
-          </a:p>
-          <a:p>
-            <a:endParaRPr lang="en-US" dirty="0">
-              <a:latin typeface="Arial" panose="020B0604020202020204" pitchFamily="34" charset="0"/>
-              <a:cs typeface="Arial" panose="020B0604020202020204" pitchFamily="34" charset="0"/>
-            </a:endParaRPr>
-          </a:p>
-          <a:p>
-            <a:r>
-              <a:rPr lang="en-US" dirty="0">
-                <a:latin typeface="Arial" panose="020B0604020202020204" pitchFamily="34" charset="0"/>
-                <a:cs typeface="Arial" panose="020B0604020202020204" pitchFamily="34" charset="0"/>
-              </a:rPr>
-              <a:t>The app might also let users make the Pokémon from 2 recent searches battle, to see which may be best for them.</a:t>
-            </a:r>
-          </a:p>
-          <a:p>
             <a:endParaRPr lang="en-US" dirty="0">
               <a:latin typeface="Arial" panose="020B0604020202020204" pitchFamily="34" charset="0"/>
               <a:cs typeface="Arial" panose="020B0604020202020204" pitchFamily="34" charset="0"/>
@@ -1083,6 +1162,90 @@
     <p:extLst>
       <p:ext uri="{BB962C8B-B14F-4D97-AF65-F5344CB8AC3E}">
         <p14:creationId xmlns:p14="http://schemas.microsoft.com/office/powerpoint/2010/main" val="2491984926"/>
+      </p:ext>
+    </p:extLst>
+  </p:cSld>
+  <p:clrMapOvr>
+    <a:masterClrMapping/>
+  </p:clrMapOvr>
+</p:notes>
+</file>
+
+<file path=ppt/notesSlides/notesSlide8.xml><?xml version="1.0" encoding="utf-8"?>
+<p:notes xmlns:a="http://schemas.openxmlformats.org/drawingml/2006/main" xmlns:r="http://schemas.openxmlformats.org/officeDocument/2006/relationships" xmlns:p="http://schemas.openxmlformats.org/presentationml/2006/main">
+  <p:cSld>
+    <p:spTree>
+      <p:nvGrpSpPr>
+        <p:cNvPr id="1" name=""/>
+        <p:cNvGrpSpPr/>
+        <p:nvPr/>
+      </p:nvGrpSpPr>
+      <p:grpSpPr>
+        <a:xfrm>
+          <a:off x="0" y="0"/>
+          <a:ext cx="0" cy="0"/>
+          <a:chOff x="0" y="0"/>
+          <a:chExt cx="0" cy="0"/>
+        </a:xfrm>
+      </p:grpSpPr>
+      <p:sp>
+        <p:nvSpPr>
+          <p:cNvPr id="2" name="Slide Image Placeholder 1"/>
+          <p:cNvSpPr>
+            <a:spLocks noGrp="1" noRot="1" noChangeAspect="1"/>
+          </p:cNvSpPr>
+          <p:nvPr>
+            <p:ph type="sldImg"/>
+          </p:nvPr>
+        </p:nvSpPr>
+        <p:spPr/>
+      </p:sp>
+      <p:sp>
+        <p:nvSpPr>
+          <p:cNvPr id="3" name="Notes Placeholder 2"/>
+          <p:cNvSpPr>
+            <a:spLocks noGrp="1"/>
+          </p:cNvSpPr>
+          <p:nvPr>
+            <p:ph type="body" idx="1"/>
+          </p:nvPr>
+        </p:nvSpPr>
+        <p:spPr/>
+        <p:txBody>
+          <a:bodyPr/>
+          <a:lstStyle/>
+          <a:p>
+            <a:endParaRPr lang="en-AU" dirty="0"/>
+          </a:p>
+        </p:txBody>
+      </p:sp>
+      <p:sp>
+        <p:nvSpPr>
+          <p:cNvPr id="4" name="Slide Number Placeholder 3"/>
+          <p:cNvSpPr>
+            <a:spLocks noGrp="1"/>
+          </p:cNvSpPr>
+          <p:nvPr>
+            <p:ph type="sldNum" sz="quarter" idx="5"/>
+          </p:nvPr>
+        </p:nvSpPr>
+        <p:spPr/>
+        <p:txBody>
+          <a:bodyPr/>
+          <a:lstStyle/>
+          <a:p>
+            <a:fld id="{CB5CF84A-5F7B-4460-BB1F-616E2FF36F3D}" type="slidenum">
+              <a:rPr lang="en-AU" smtClean="0"/>
+              <a:t>10</a:t>
+            </a:fld>
+            <a:endParaRPr lang="en-AU"/>
+          </a:p>
+        </p:txBody>
+      </p:sp>
+    </p:spTree>
+    <p:extLst>
+      <p:ext uri="{BB962C8B-B14F-4D97-AF65-F5344CB8AC3E}">
+        <p14:creationId xmlns:p14="http://schemas.microsoft.com/office/powerpoint/2010/main" val="1436962744"/>
       </p:ext>
     </p:extLst>
   </p:cSld>
@@ -1241,7 +1404,7 @@
           <a:p>
             <a:fld id="{844DA5E3-2512-428B-A81D-C033E88CE313}" type="datetimeFigureOut">
               <a:rPr lang="en-AU" smtClean="0"/>
-              <a:t>22/08/2020</a:t>
+              <a:t>29/08/2020</a:t>
             </a:fld>
             <a:endParaRPr lang="en-AU"/>
           </a:p>
@@ -1441,7 +1604,7 @@
           <a:p>
             <a:fld id="{844DA5E3-2512-428B-A81D-C033E88CE313}" type="datetimeFigureOut">
               <a:rPr lang="en-AU" smtClean="0"/>
-              <a:t>22/08/2020</a:t>
+              <a:t>29/08/2020</a:t>
             </a:fld>
             <a:endParaRPr lang="en-AU"/>
           </a:p>
@@ -1651,7 +1814,7 @@
           <a:p>
             <a:fld id="{844DA5E3-2512-428B-A81D-C033E88CE313}" type="datetimeFigureOut">
               <a:rPr lang="en-AU" smtClean="0"/>
-              <a:t>22/08/2020</a:t>
+              <a:t>29/08/2020</a:t>
             </a:fld>
             <a:endParaRPr lang="en-AU"/>
           </a:p>
@@ -1851,7 +2014,7 @@
           <a:p>
             <a:fld id="{844DA5E3-2512-428B-A81D-C033E88CE313}" type="datetimeFigureOut">
               <a:rPr lang="en-AU" smtClean="0"/>
-              <a:t>22/08/2020</a:t>
+              <a:t>29/08/2020</a:t>
             </a:fld>
             <a:endParaRPr lang="en-AU"/>
           </a:p>
@@ -2127,7 +2290,7 @@
           <a:p>
             <a:fld id="{844DA5E3-2512-428B-A81D-C033E88CE313}" type="datetimeFigureOut">
               <a:rPr lang="en-AU" smtClean="0"/>
-              <a:t>22/08/2020</a:t>
+              <a:t>29/08/2020</a:t>
             </a:fld>
             <a:endParaRPr lang="en-AU"/>
           </a:p>
@@ -2395,7 +2558,7 @@
           <a:p>
             <a:fld id="{844DA5E3-2512-428B-A81D-C033E88CE313}" type="datetimeFigureOut">
               <a:rPr lang="en-AU" smtClean="0"/>
-              <a:t>22/08/2020</a:t>
+              <a:t>29/08/2020</a:t>
             </a:fld>
             <a:endParaRPr lang="en-AU"/>
           </a:p>
@@ -2810,7 +2973,7 @@
           <a:p>
             <a:fld id="{844DA5E3-2512-428B-A81D-C033E88CE313}" type="datetimeFigureOut">
               <a:rPr lang="en-AU" smtClean="0"/>
-              <a:t>22/08/2020</a:t>
+              <a:t>29/08/2020</a:t>
             </a:fld>
             <a:endParaRPr lang="en-AU"/>
           </a:p>
@@ -2952,7 +3115,7 @@
           <a:p>
             <a:fld id="{844DA5E3-2512-428B-A81D-C033E88CE313}" type="datetimeFigureOut">
               <a:rPr lang="en-AU" smtClean="0"/>
-              <a:t>22/08/2020</a:t>
+              <a:t>29/08/2020</a:t>
             </a:fld>
             <a:endParaRPr lang="en-AU"/>
           </a:p>
@@ -3065,7 +3228,7 @@
           <a:p>
             <a:fld id="{844DA5E3-2512-428B-A81D-C033E88CE313}" type="datetimeFigureOut">
               <a:rPr lang="en-AU" smtClean="0"/>
-              <a:t>22/08/2020</a:t>
+              <a:t>29/08/2020</a:t>
             </a:fld>
             <a:endParaRPr lang="en-AU"/>
           </a:p>
@@ -3378,7 +3541,7 @@
           <a:p>
             <a:fld id="{844DA5E3-2512-428B-A81D-C033E88CE313}" type="datetimeFigureOut">
               <a:rPr lang="en-AU" smtClean="0"/>
-              <a:t>22/08/2020</a:t>
+              <a:t>29/08/2020</a:t>
             </a:fld>
             <a:endParaRPr lang="en-AU"/>
           </a:p>
@@ -3667,7 +3830,7 @@
           <a:p>
             <a:fld id="{844DA5E3-2512-428B-A81D-C033E88CE313}" type="datetimeFigureOut">
               <a:rPr lang="en-AU" smtClean="0"/>
-              <a:t>22/08/2020</a:t>
+              <a:t>29/08/2020</a:t>
             </a:fld>
             <a:endParaRPr lang="en-AU"/>
           </a:p>
@@ -3910,7 +4073,7 @@
           <a:p>
             <a:fld id="{844DA5E3-2512-428B-A81D-C033E88CE313}" type="datetimeFigureOut">
               <a:rPr lang="en-AU" smtClean="0"/>
-              <a:t>22/08/2020</a:t>
+              <a:t>29/08/2020</a:t>
             </a:fld>
             <a:endParaRPr lang="en-AU"/>
           </a:p>
@@ -5357,7 +5520,7 @@
         </p:nvSpPr>
         <p:spPr>
           <a:xfrm>
-            <a:off x="1043940" y="2507853"/>
+            <a:off x="1043940" y="2012553"/>
             <a:ext cx="10515600" cy="2366171"/>
           </a:xfrm>
         </p:spPr>
@@ -5373,13 +5536,26 @@
               <a:t>Deployed: </a:t>
             </a:r>
             <a:r>
+              <a:rPr lang="en-US" dirty="0">
+                <a:latin typeface="Arial" panose="020B0604020202020204" pitchFamily="34" charset="0"/>
+                <a:cs typeface="Arial" panose="020B0604020202020204" pitchFamily="34" charset="0"/>
+                <a:hlinkClick r:id="rId3"/>
+              </a:rPr>
+              <a:t>https://powerful-mountain-92684.herokuapp.com/</a:t>
+            </a:r>
+            <a:r>
+              <a:rPr lang="en-US" dirty="0">
+                <a:latin typeface="Arial" panose="020B0604020202020204" pitchFamily="34" charset="0"/>
+                <a:cs typeface="Arial" panose="020B0604020202020204" pitchFamily="34" charset="0"/>
+              </a:rPr>
+              <a:t> </a:t>
+            </a:r>
+            <a:br>
               <a:rPr lang="en-AU" dirty="0">
                 <a:latin typeface="Arial" panose="020B0604020202020204" pitchFamily="34" charset="0"/>
                 <a:cs typeface="Arial" panose="020B0604020202020204" pitchFamily="34" charset="0"/>
-                <a:hlinkClick r:id="rId2"/>
               </a:rPr>
-              <a:t>https://thomasmaglaris.github.io/Project-2/</a:t>
-            </a:r>
+            </a:br>
             <a:endParaRPr lang="en-US" dirty="0">
               <a:latin typeface="Arial" panose="020B0604020202020204" pitchFamily="34" charset="0"/>
               <a:cs typeface="Arial" panose="020B0604020202020204" pitchFamily="34" charset="0"/>
@@ -5397,9 +5573,33 @@
               <a:rPr lang="en-AU" dirty="0">
                 <a:latin typeface="Arial" panose="020B0604020202020204" pitchFamily="34" charset="0"/>
                 <a:cs typeface="Arial" panose="020B0604020202020204" pitchFamily="34" charset="0"/>
-                <a:hlinkClick r:id="rId3"/>
+                <a:hlinkClick r:id="rId4"/>
               </a:rPr>
-              <a:t>https://github.com/thomasmaglaris/Project-2</a:t>
+              <a:t>https://github.com/thomasmaglaris/</a:t>
+            </a:r>
+            <a:r>
+              <a:rPr lang="en-AU" dirty="0">
+                <a:latin typeface="Arial" panose="020B0604020202020204" pitchFamily="34" charset="0"/>
+                <a:cs typeface="Arial" panose="020B0604020202020204" pitchFamily="34" charset="0"/>
+                <a:hlinkClick r:id="rId5"/>
+              </a:rPr>
+              <a:t> Professor-Oaks-s-</a:t>
+            </a:r>
+            <a:r>
+              <a:rPr lang="en-AU" dirty="0" err="1">
+                <a:latin typeface="Arial" panose="020B0604020202020204" pitchFamily="34" charset="0"/>
+                <a:cs typeface="Arial" panose="020B0604020202020204" pitchFamily="34" charset="0"/>
+                <a:hlinkClick r:id="rId5"/>
+              </a:rPr>
+              <a:t>Pokemon</a:t>
+            </a:r>
+            <a:r>
+              <a:rPr lang="en-AU" dirty="0">
+                <a:latin typeface="Arial" panose="020B0604020202020204" pitchFamily="34" charset="0"/>
+                <a:cs typeface="Arial" panose="020B0604020202020204" pitchFamily="34" charset="0"/>
+                <a:hlinkClick r:id="rId5"/>
+              </a:rPr>
+              <a:t>-Love-Calculator</a:t>
             </a:r>
             <a:r>
               <a:rPr lang="en-AU" dirty="0">
@@ -5426,7 +5626,7 @@
           <p:nvPr/>
         </p:nvPicPr>
         <p:blipFill>
-          <a:blip r:embed="rId4">
+          <a:blip r:embed="rId6">
             <a:extLst>
               <a:ext uri="{28A0092B-C50C-407E-A947-70E740481C1C}">
                 <a14:useLocalDpi xmlns:a14="http://schemas.microsoft.com/office/drawing/2010/main" val="0"/>
@@ -5728,8 +5928,8 @@
         </p:blipFill>
         <p:spPr>
           <a:xfrm>
-            <a:off x="91440" y="3760472"/>
-            <a:ext cx="3337695" cy="2971798"/>
+            <a:off x="685800" y="2604043"/>
+            <a:ext cx="3909060" cy="3480527"/>
           </a:xfrm>
           <a:prstGeom prst="rect">
             <a:avLst/>
@@ -5906,6 +6106,42 @@
           </p:txBody>
         </p:sp>
       </p:grpSp>
+      <p:pic>
+        <p:nvPicPr>
+          <p:cNvPr id="6" name="Picture 5">
+            <a:extLst>
+              <a:ext uri="{FF2B5EF4-FFF2-40B4-BE49-F238E27FC236}">
+                <a16:creationId xmlns:a16="http://schemas.microsoft.com/office/drawing/2014/main" id="{751830F4-307B-4F23-A136-D3A2EF061F97}"/>
+              </a:ext>
+            </a:extLst>
+          </p:cNvPr>
+          <p:cNvPicPr>
+            <a:picLocks noChangeAspect="1"/>
+          </p:cNvPicPr>
+          <p:nvPr/>
+        </p:nvPicPr>
+        <p:blipFill>
+          <a:blip r:embed="rId4">
+            <a:extLst>
+              <a:ext uri="{28A0092B-C50C-407E-A947-70E740481C1C}">
+                <a14:useLocalDpi xmlns:a14="http://schemas.microsoft.com/office/drawing/2010/main" val="0"/>
+              </a:ext>
+            </a:extLst>
+          </a:blip>
+          <a:stretch>
+            <a:fillRect/>
+          </a:stretch>
+        </p:blipFill>
+        <p:spPr>
+          <a:xfrm>
+            <a:off x="5951019" y="2137359"/>
+            <a:ext cx="5555181" cy="4313898"/>
+          </a:xfrm>
+          <a:prstGeom prst="rect">
+            <a:avLst/>
+          </a:prstGeom>
+        </p:spPr>
+      </p:pic>
     </p:spTree>
     <p:extLst>
       <p:ext uri="{BB962C8B-B14F-4D97-AF65-F5344CB8AC3E}">
@@ -6346,8 +6582,8 @@
         </p:nvSpPr>
         <p:spPr>
           <a:xfrm>
-            <a:off x="185644" y="1569614"/>
-            <a:ext cx="5593173" cy="3718771"/>
+            <a:off x="185644" y="1569613"/>
+            <a:ext cx="5593173" cy="4577186"/>
           </a:xfrm>
         </p:spPr>
         <p:txBody>
@@ -6428,6 +6664,56 @@
                 <a:cs typeface="Arial" panose="020B0604020202020204" pitchFamily="34" charset="0"/>
               </a:rPr>
               <a:t>			this person would be!</a:t>
+            </a:r>
+          </a:p>
+          <a:p>
+            <a:pPr marL="0" indent="0">
+              <a:buNone/>
+            </a:pPr>
+            <a:r>
+              <a:rPr lang="en-US" sz="2000" dirty="0">
+                <a:latin typeface="Arial" panose="020B0604020202020204" pitchFamily="34" charset="0"/>
+                <a:cs typeface="Arial" panose="020B0604020202020204" pitchFamily="34" charset="0"/>
+              </a:rPr>
+              <a:t>			The app then saves the </a:t>
+            </a:r>
+            <a:br>
+              <a:rPr lang="en-US" sz="2000" dirty="0">
+                <a:latin typeface="Arial" panose="020B0604020202020204" pitchFamily="34" charset="0"/>
+                <a:cs typeface="Arial" panose="020B0604020202020204" pitchFamily="34" charset="0"/>
+              </a:rPr>
+            </a:br>
+            <a:r>
+              <a:rPr lang="en-US" sz="2000" dirty="0">
+                <a:latin typeface="Arial" panose="020B0604020202020204" pitchFamily="34" charset="0"/>
+                <a:cs typeface="Arial" panose="020B0604020202020204" pitchFamily="34" charset="0"/>
+              </a:rPr>
+              <a:t>			highest compatibility</a:t>
+            </a:r>
+            <a:br>
+              <a:rPr lang="en-US" sz="2000" dirty="0">
+                <a:latin typeface="Arial" panose="020B0604020202020204" pitchFamily="34" charset="0"/>
+                <a:cs typeface="Arial" panose="020B0604020202020204" pitchFamily="34" charset="0"/>
+              </a:rPr>
+            </a:br>
+            <a:r>
+              <a:rPr lang="en-US" sz="2000" dirty="0">
+                <a:latin typeface="Arial" panose="020B0604020202020204" pitchFamily="34" charset="0"/>
+                <a:cs typeface="Arial" panose="020B0604020202020204" pitchFamily="34" charset="0"/>
+              </a:rPr>
+              <a:t>			scores for reference.</a:t>
+            </a:r>
+          </a:p>
+          <a:p>
+            <a:pPr marL="0" indent="0">
+              <a:buNone/>
+            </a:pPr>
+            <a:r>
+              <a:rPr lang="en-US" sz="2000" dirty="0">
+                <a:latin typeface="Arial" panose="020B0604020202020204" pitchFamily="34" charset="0"/>
+                <a:cs typeface="Arial" panose="020B0604020202020204" pitchFamily="34" charset="0"/>
+              </a:rPr>
+              <a:t>			</a:t>
             </a:r>
           </a:p>
           <a:p>
@@ -6471,6 +6757,42 @@
           <a:xfrm flipH="1">
             <a:off x="25624" y="3853815"/>
             <a:ext cx="2876550" cy="2990850"/>
+          </a:xfrm>
+          <a:prstGeom prst="rect">
+            <a:avLst/>
+          </a:prstGeom>
+        </p:spPr>
+      </p:pic>
+      <p:pic>
+        <p:nvPicPr>
+          <p:cNvPr id="6" name="Picture 5">
+            <a:extLst>
+              <a:ext uri="{FF2B5EF4-FFF2-40B4-BE49-F238E27FC236}">
+                <a16:creationId xmlns:a16="http://schemas.microsoft.com/office/drawing/2014/main" id="{F250D3E3-FE22-4ED9-BB9C-138C8423B649}"/>
+              </a:ext>
+            </a:extLst>
+          </p:cNvPr>
+          <p:cNvPicPr>
+            <a:picLocks noChangeAspect="1"/>
+          </p:cNvPicPr>
+          <p:nvPr/>
+        </p:nvPicPr>
+        <p:blipFill>
+          <a:blip r:embed="rId4">
+            <a:extLst>
+              <a:ext uri="{28A0092B-C50C-407E-A947-70E740481C1C}">
+                <a14:useLocalDpi xmlns:a14="http://schemas.microsoft.com/office/drawing/2010/main" val="0"/>
+              </a:ext>
+            </a:extLst>
+          </a:blip>
+          <a:stretch>
+            <a:fillRect/>
+          </a:stretch>
+        </p:blipFill>
+        <p:spPr>
+          <a:xfrm>
+            <a:off x="8117429" y="1700212"/>
+            <a:ext cx="2272169" cy="4873943"/>
           </a:xfrm>
           <a:prstGeom prst="rect">
             <a:avLst/>
@@ -6981,7 +7303,7 @@
                 <a:latin typeface="Arial" panose="020B0604020202020204" pitchFamily="34" charset="0"/>
                 <a:cs typeface="Arial" panose="020B0604020202020204" pitchFamily="34" charset="0"/>
               </a:rPr>
-              <a:t>Saves 10 highest and lowest scores recorded on the app.</a:t>
+              <a:t>Saves the highest scores recorded on the app.</a:t>
             </a:r>
           </a:p>
           <a:p>
@@ -7038,7 +7360,7 @@
                 <a:latin typeface="Arial" panose="020B0604020202020204" pitchFamily="34" charset="0"/>
                 <a:cs typeface="Arial" panose="020B0604020202020204" pitchFamily="34" charset="0"/>
               </a:rPr>
-              <a:t>As a single person and lover of Pokémon: I want to search the compatibility of my name with that of a potential partner. I would then like the potential relationship rated in relation to a Pokémon I know. I would also like to know some of the most and least compatible names. This is so I can have fun investigating my compatibility with different people, and have a laugh at the same time.</a:t>
+              <a:t>As a single person and lover of Pokémon: I want to search the compatibility of my name with that of a potential partner. I would then like the potential relationship rated in relation to a Pokémon I know. I would also like to know some of the most compatible names. This is so I can have fun investigating my compatibility with different people, and have a laugh at the same time.</a:t>
             </a:r>
             <a:endParaRPr lang="en-AU" dirty="0">
               <a:latin typeface="Arial" panose="020B0604020202020204" pitchFamily="34" charset="0"/>
@@ -7521,19 +7843,21 @@
         </p:nvSpPr>
         <p:spPr>
           <a:xfrm>
-            <a:off x="2745104" y="2029777"/>
-            <a:ext cx="8620126" cy="4738554"/>
+            <a:off x="2745104" y="2029776"/>
+            <a:ext cx="4722496" cy="4917119"/>
           </a:xfrm>
         </p:spPr>
         <p:txBody>
-          <a:bodyPr/>
+          <a:bodyPr>
+            <a:normAutofit lnSpcReduction="10000"/>
+          </a:bodyPr>
           <a:lstStyle/>
           <a:p>
             <a:pPr marL="0" indent="0">
               <a:buNone/>
             </a:pPr>
             <a:r>
-              <a:rPr lang="en-US" dirty="0">
+              <a:rPr lang="en-US" b="1" dirty="0">
                 <a:latin typeface="Arial" panose="020B0604020202020204" pitchFamily="34" charset="0"/>
                 <a:cs typeface="Arial" panose="020B0604020202020204" pitchFamily="34" charset="0"/>
               </a:rPr>
@@ -7549,34 +7873,59 @@
           <a:p>
             <a:r>
               <a:rPr lang="en-AU" dirty="0"/>
-              <a:t>CSS: Bootstrap, FontAwesome</a:t>
+              <a:t>CSS: Bootstrap, Google Fonts</a:t>
             </a:r>
           </a:p>
           <a:p>
             <a:r>
               <a:rPr lang="en-AU" dirty="0"/>
-              <a:t>JavaScript:  JQuery, Node</a:t>
-            </a:r>
+              <a:t>JavaScript: </a:t>
+            </a:r>
+            <a:r>
+              <a:rPr lang="en-AU" dirty="0" err="1"/>
+              <a:t>JQuery</a:t>
+            </a:r>
+            <a:endParaRPr lang="en-AU" dirty="0"/>
           </a:p>
           <a:p>
             <a:r>
               <a:rPr lang="en-AU" dirty="0"/>
-              <a:t>Other API’s: Pokémon API, Name match API</a:t>
-            </a:r>
-          </a:p>
-          <a:p>
-            <a:pPr lvl="1"/>
-            <a:endParaRPr lang="en-US" dirty="0">
-              <a:latin typeface="Arial" panose="020B0604020202020204" pitchFamily="34" charset="0"/>
-              <a:cs typeface="Arial" panose="020B0604020202020204" pitchFamily="34" charset="0"/>
-            </a:endParaRPr>
-          </a:p>
-          <a:p>
-            <a:pPr lvl="1"/>
-            <a:endParaRPr lang="en-US" dirty="0">
-              <a:latin typeface="Arial" panose="020B0604020202020204" pitchFamily="34" charset="0"/>
-              <a:cs typeface="Arial" panose="020B0604020202020204" pitchFamily="34" charset="0"/>
-            </a:endParaRPr>
+              <a:t>Node, Express</a:t>
+            </a:r>
+          </a:p>
+          <a:p>
+            <a:r>
+              <a:rPr lang="en-AU" dirty="0"/>
+              <a:t>MySQL</a:t>
+            </a:r>
+          </a:p>
+          <a:p>
+            <a:r>
+              <a:rPr lang="en-AU" dirty="0"/>
+              <a:t>Handlebars</a:t>
+            </a:r>
+          </a:p>
+          <a:p>
+            <a:r>
+              <a:rPr lang="en-AU" dirty="0"/>
+              <a:t>Heroku</a:t>
+            </a:r>
+          </a:p>
+          <a:p>
+            <a:r>
+              <a:rPr lang="en-AU" dirty="0"/>
+              <a:t>MVC</a:t>
+            </a:r>
+          </a:p>
+          <a:p>
+            <a:r>
+              <a:rPr lang="en-AU" dirty="0" err="1"/>
+              <a:t>Sequelize</a:t>
+            </a:r>
+            <a:r>
+              <a:rPr lang="en-AU" dirty="0"/>
+              <a:t> ORM</a:t>
+            </a:r>
           </a:p>
           <a:p>
             <a:pPr lvl="1"/>
@@ -7630,583 +7979,12 @@
           </a:prstGeom>
         </p:spPr>
       </p:pic>
-    </p:spTree>
-    <p:extLst>
-      <p:ext uri="{BB962C8B-B14F-4D97-AF65-F5344CB8AC3E}">
-        <p14:creationId xmlns:p14="http://schemas.microsoft.com/office/powerpoint/2010/main" val="1104210967"/>
-      </p:ext>
-    </p:extLst>
-  </p:cSld>
-  <p:clrMapOvr>
-    <a:masterClrMapping/>
-  </p:clrMapOvr>
-  <p:timing>
-    <p:tnLst>
-      <p:par>
-        <p:cTn id="1" dur="indefinite" restart="never" nodeType="tmRoot">
-          <p:childTnLst>
-            <p:seq concurrent="1" nextAc="seek">
-              <p:cTn id="2" dur="indefinite" nodeType="mainSeq">
-                <p:childTnLst>
-                  <p:par>
-                    <p:cTn id="3" fill="hold">
-                      <p:stCondLst>
-                        <p:cond delay="indefinite"/>
-                        <p:cond evt="onBegin" delay="0">
-                          <p:tn val="2"/>
-                        </p:cond>
-                      </p:stCondLst>
-                      <p:childTnLst>
-                        <p:par>
-                          <p:cTn id="4" fill="hold">
-                            <p:stCondLst>
-                              <p:cond delay="0"/>
-                            </p:stCondLst>
-                            <p:childTnLst>
-                              <p:par>
-                                <p:cTn id="5" presetID="2" presetClass="entr" presetSubtype="8" fill="hold" nodeType="afterEffect">
-                                  <p:stCondLst>
-                                    <p:cond delay="1000"/>
-                                  </p:stCondLst>
-                                  <p:childTnLst>
-                                    <p:set>
-                                      <p:cBhvr>
-                                        <p:cTn id="6" dur="1" fill="hold">
-                                          <p:stCondLst>
-                                            <p:cond delay="0"/>
-                                          </p:stCondLst>
-                                        </p:cTn>
-                                        <p:tgtEl>
-                                          <p:spTgt spid="13"/>
-                                        </p:tgtEl>
-                                        <p:attrNameLst>
-                                          <p:attrName>style.visibility</p:attrName>
-                                        </p:attrNameLst>
-                                      </p:cBhvr>
-                                      <p:to>
-                                        <p:strVal val="visible"/>
-                                      </p:to>
-                                    </p:set>
-                                    <p:anim calcmode="lin" valueType="num">
-                                      <p:cBhvr additive="base">
-                                        <p:cTn id="7" dur="1000" fill="hold"/>
-                                        <p:tgtEl>
-                                          <p:spTgt spid="13"/>
-                                        </p:tgtEl>
-                                        <p:attrNameLst>
-                                          <p:attrName>ppt_x</p:attrName>
-                                        </p:attrNameLst>
-                                      </p:cBhvr>
-                                      <p:tavLst>
-                                        <p:tav tm="0">
-                                          <p:val>
-                                            <p:strVal val="0-#ppt_w/2"/>
-                                          </p:val>
-                                        </p:tav>
-                                        <p:tav tm="100000">
-                                          <p:val>
-                                            <p:strVal val="#ppt_x"/>
-                                          </p:val>
-                                        </p:tav>
-                                      </p:tavLst>
-                                    </p:anim>
-                                    <p:anim calcmode="lin" valueType="num">
-                                      <p:cBhvr additive="base">
-                                        <p:cTn id="8" dur="1000" fill="hold"/>
-                                        <p:tgtEl>
-                                          <p:spTgt spid="13"/>
-                                        </p:tgtEl>
-                                        <p:attrNameLst>
-                                          <p:attrName>ppt_y</p:attrName>
-                                        </p:attrNameLst>
-                                      </p:cBhvr>
-                                      <p:tavLst>
-                                        <p:tav tm="0">
-                                          <p:val>
-                                            <p:strVal val="#ppt_y"/>
-                                          </p:val>
-                                        </p:tav>
-                                        <p:tav tm="100000">
-                                          <p:val>
-                                            <p:strVal val="#ppt_y"/>
-                                          </p:val>
-                                        </p:tav>
-                                      </p:tavLst>
-                                    </p:anim>
-                                  </p:childTnLst>
-                                </p:cTn>
-                              </p:par>
-                            </p:childTnLst>
-                          </p:cTn>
-                        </p:par>
-                      </p:childTnLst>
-                    </p:cTn>
-                  </p:par>
-                </p:childTnLst>
-              </p:cTn>
-              <p:prevCondLst>
-                <p:cond evt="onPrev" delay="0">
-                  <p:tgtEl>
-                    <p:sldTgt/>
-                  </p:tgtEl>
-                </p:cond>
-              </p:prevCondLst>
-              <p:nextCondLst>
-                <p:cond evt="onNext" delay="0">
-                  <p:tgtEl>
-                    <p:sldTgt/>
-                  </p:tgtEl>
-                </p:cond>
-              </p:nextCondLst>
-            </p:seq>
-          </p:childTnLst>
-        </p:cTn>
-      </p:par>
-    </p:tnLst>
-  </p:timing>
-</p:sld>
-</file>
-
-<file path=ppt/slides/slide6.xml><?xml version="1.0" encoding="utf-8"?>
-<p:sld xmlns:a="http://schemas.openxmlformats.org/drawingml/2006/main" xmlns:r="http://schemas.openxmlformats.org/officeDocument/2006/relationships" xmlns:p="http://schemas.openxmlformats.org/presentationml/2006/main">
-  <p:cSld>
-    <p:spTree>
-      <p:nvGrpSpPr>
-        <p:cNvPr id="1" name=""/>
-        <p:cNvGrpSpPr/>
-        <p:nvPr/>
-      </p:nvGrpSpPr>
-      <p:grpSpPr>
-        <a:xfrm>
-          <a:off x="0" y="0"/>
-          <a:ext cx="0" cy="0"/>
-          <a:chOff x="0" y="0"/>
-          <a:chExt cx="0" cy="0"/>
-        </a:xfrm>
-      </p:grpSpPr>
-      <p:sp>
-        <p:nvSpPr>
-          <p:cNvPr id="17" name="Rectangle 16">
+      <p:sp>
+        <p:nvSpPr>
+          <p:cNvPr id="10" name="Content Placeholder 2">
             <a:extLst>
               <a:ext uri="{FF2B5EF4-FFF2-40B4-BE49-F238E27FC236}">
-                <a16:creationId xmlns:a16="http://schemas.microsoft.com/office/drawing/2014/main" id="{E023F43E-14BD-4FDA-B8AA-2801F0F8788E}"/>
-              </a:ext>
-            </a:extLst>
-          </p:cNvPr>
-          <p:cNvSpPr/>
-          <p:nvPr/>
-        </p:nvSpPr>
-        <p:spPr>
-          <a:xfrm>
-            <a:off x="0" y="-1"/>
-            <a:ext cx="12192000" cy="1383023"/>
-          </a:xfrm>
-          <a:prstGeom prst="rect">
-            <a:avLst/>
-          </a:prstGeom>
-          <a:solidFill>
-            <a:srgbClr val="FFCCCC"/>
-          </a:solidFill>
-          <a:ln>
-            <a:noFill/>
-          </a:ln>
-        </p:spPr>
-        <p:style>
-          <a:lnRef idx="2">
-            <a:schemeClr val="accent1">
-              <a:shade val="50000"/>
-            </a:schemeClr>
-          </a:lnRef>
-          <a:fillRef idx="1">
-            <a:schemeClr val="accent1"/>
-          </a:fillRef>
-          <a:effectRef idx="0">
-            <a:schemeClr val="accent1"/>
-          </a:effectRef>
-          <a:fontRef idx="minor">
-            <a:schemeClr val="lt1"/>
-          </a:fontRef>
-        </p:style>
-        <p:txBody>
-          <a:bodyPr rtlCol="0" anchor="ctr"/>
-          <a:lstStyle/>
-          <a:p>
-            <a:pPr algn="ctr"/>
-            <a:endParaRPr lang="en-AU">
-              <a:solidFill>
-                <a:srgbClr val="FFCCCC"/>
-              </a:solidFill>
-            </a:endParaRPr>
-          </a:p>
-        </p:txBody>
-      </p:sp>
-      <p:grpSp>
-        <p:nvGrpSpPr>
-          <p:cNvPr id="18" name="Group 17">
-            <a:extLst>
-              <a:ext uri="{FF2B5EF4-FFF2-40B4-BE49-F238E27FC236}">
-                <a16:creationId xmlns:a16="http://schemas.microsoft.com/office/drawing/2014/main" id="{F157B295-7522-4145-A529-E3AAD31A20B1}"/>
-              </a:ext>
-            </a:extLst>
-          </p:cNvPr>
-          <p:cNvGrpSpPr/>
-          <p:nvPr/>
-        </p:nvGrpSpPr>
-        <p:grpSpPr>
-          <a:xfrm>
-            <a:off x="0" y="901065"/>
-            <a:ext cx="12192000" cy="963930"/>
-            <a:chOff x="0" y="1175385"/>
-            <a:chExt cx="12192000" cy="963930"/>
-          </a:xfrm>
-        </p:grpSpPr>
-        <p:cxnSp>
-          <p:nvCxnSpPr>
-            <p:cNvPr id="19" name="Straight Connector 18">
-              <a:extLst>
-                <a:ext uri="{FF2B5EF4-FFF2-40B4-BE49-F238E27FC236}">
-                  <a16:creationId xmlns:a16="http://schemas.microsoft.com/office/drawing/2014/main" id="{6463D5A2-89FD-4DB8-B8D4-EA47690B46B8}"/>
-                </a:ext>
-              </a:extLst>
-            </p:cNvPr>
-            <p:cNvCxnSpPr/>
-            <p:nvPr/>
-          </p:nvCxnSpPr>
-          <p:spPr>
-            <a:xfrm>
-              <a:off x="0" y="1657350"/>
-              <a:ext cx="12192000" cy="0"/>
-            </a:xfrm>
-            <a:prstGeom prst="line">
-              <a:avLst/>
-            </a:prstGeom>
-            <a:ln w="127000">
-              <a:solidFill>
-                <a:schemeClr val="tx1"/>
-              </a:solidFill>
-            </a:ln>
-          </p:spPr>
-          <p:style>
-            <a:lnRef idx="1">
-              <a:schemeClr val="accent1"/>
-            </a:lnRef>
-            <a:fillRef idx="0">
-              <a:schemeClr val="accent1"/>
-            </a:fillRef>
-            <a:effectRef idx="0">
-              <a:schemeClr val="accent1"/>
-            </a:effectRef>
-            <a:fontRef idx="minor">
-              <a:schemeClr val="tx1"/>
-            </a:fontRef>
-          </p:style>
-        </p:cxnSp>
-        <p:sp>
-          <p:nvSpPr>
-            <p:cNvPr id="20" name="Oval 19">
-              <a:extLst>
-                <a:ext uri="{FF2B5EF4-FFF2-40B4-BE49-F238E27FC236}">
-                  <a16:creationId xmlns:a16="http://schemas.microsoft.com/office/drawing/2014/main" id="{6E08FFDA-FE06-4AD2-B50A-3CBFB908021B}"/>
-                </a:ext>
-              </a:extLst>
-            </p:cNvPr>
-            <p:cNvSpPr/>
-            <p:nvPr/>
-          </p:nvSpPr>
-          <p:spPr>
-            <a:xfrm>
-              <a:off x="5614035" y="1175385"/>
-              <a:ext cx="963930" cy="963930"/>
-            </a:xfrm>
-            <a:prstGeom prst="ellipse">
-              <a:avLst/>
-            </a:prstGeom>
-            <a:solidFill>
-              <a:schemeClr val="bg1"/>
-            </a:solidFill>
-            <a:ln w="76200">
-              <a:solidFill>
-                <a:schemeClr val="tx1"/>
-              </a:solidFill>
-            </a:ln>
-          </p:spPr>
-          <p:style>
-            <a:lnRef idx="2">
-              <a:schemeClr val="accent1">
-                <a:shade val="50000"/>
-              </a:schemeClr>
-            </a:lnRef>
-            <a:fillRef idx="1">
-              <a:schemeClr val="accent1"/>
-            </a:fillRef>
-            <a:effectRef idx="0">
-              <a:schemeClr val="accent1"/>
-            </a:effectRef>
-            <a:fontRef idx="minor">
-              <a:schemeClr val="lt1"/>
-            </a:fontRef>
-          </p:style>
-          <p:txBody>
-            <a:bodyPr rtlCol="0" anchor="ctr"/>
-            <a:lstStyle/>
-            <a:p>
-              <a:pPr algn="ctr"/>
-              <a:endParaRPr lang="en-AU"/>
-            </a:p>
-          </p:txBody>
-        </p:sp>
-        <p:sp>
-          <p:nvSpPr>
-            <p:cNvPr id="21" name="Oval 20">
-              <a:extLst>
-                <a:ext uri="{FF2B5EF4-FFF2-40B4-BE49-F238E27FC236}">
-                  <a16:creationId xmlns:a16="http://schemas.microsoft.com/office/drawing/2014/main" id="{6CAA3F05-A145-4539-9AFC-D72D15504B6F}"/>
-                </a:ext>
-              </a:extLst>
-            </p:cNvPr>
-            <p:cNvSpPr/>
-            <p:nvPr/>
-          </p:nvSpPr>
-          <p:spPr>
-            <a:xfrm>
-              <a:off x="5778817" y="1340167"/>
-              <a:ext cx="634365" cy="634365"/>
-            </a:xfrm>
-            <a:prstGeom prst="ellipse">
-              <a:avLst/>
-            </a:prstGeom>
-            <a:solidFill>
-              <a:schemeClr val="bg1"/>
-            </a:solidFill>
-            <a:ln w="76200">
-              <a:solidFill>
-                <a:schemeClr val="tx1"/>
-              </a:solidFill>
-            </a:ln>
-          </p:spPr>
-          <p:style>
-            <a:lnRef idx="2">
-              <a:schemeClr val="accent1">
-                <a:shade val="50000"/>
-              </a:schemeClr>
-            </a:lnRef>
-            <a:fillRef idx="1">
-              <a:schemeClr val="accent1"/>
-            </a:fillRef>
-            <a:effectRef idx="0">
-              <a:schemeClr val="accent1"/>
-            </a:effectRef>
-            <a:fontRef idx="minor">
-              <a:schemeClr val="lt1"/>
-            </a:fontRef>
-          </p:style>
-          <p:txBody>
-            <a:bodyPr rtlCol="0" anchor="ctr"/>
-            <a:lstStyle/>
-            <a:p>
-              <a:pPr algn="ctr"/>
-              <a:endParaRPr lang="en-AU"/>
-            </a:p>
-          </p:txBody>
-        </p:sp>
-      </p:grpSp>
-      <p:sp>
-        <p:nvSpPr>
-          <p:cNvPr id="2" name="Title 1">
-            <a:extLst>
-              <a:ext uri="{FF2B5EF4-FFF2-40B4-BE49-F238E27FC236}">
-                <a16:creationId xmlns:a16="http://schemas.microsoft.com/office/drawing/2014/main" id="{0B2F6EA6-8BB2-4F7D-ABC9-16EECF9F8F97}"/>
-              </a:ext>
-            </a:extLst>
-          </p:cNvPr>
-          <p:cNvSpPr>
-            <a:spLocks noGrp="1"/>
-          </p:cNvSpPr>
-          <p:nvPr>
-            <p:ph type="title"/>
-          </p:nvPr>
-        </p:nvSpPr>
-        <p:spPr>
-          <a:xfrm>
-            <a:off x="388620" y="-164784"/>
-            <a:ext cx="11252349" cy="1325563"/>
-          </a:xfrm>
-        </p:spPr>
-        <p:txBody>
-          <a:bodyPr/>
-          <a:lstStyle/>
-          <a:p>
-            <a:r>
-              <a:rPr lang="en-US" dirty="0">
-                <a:latin typeface="Arial Black" panose="020B0A04020102020204" pitchFamily="34" charset="0"/>
-                <a:cs typeface="Arial" panose="020B0604020202020204" pitchFamily="34" charset="0"/>
-              </a:rPr>
-              <a:t>Process – </a:t>
-            </a:r>
-            <a:r>
-              <a:rPr lang="en-US" sz="4000" dirty="0">
-                <a:latin typeface="Arial Black" panose="020B0A04020102020204" pitchFamily="34" charset="0"/>
-                <a:cs typeface="Arial" panose="020B0604020202020204" pitchFamily="34" charset="0"/>
-              </a:rPr>
-              <a:t>Breakdown of tasks &amp; roles</a:t>
-            </a:r>
-            <a:endParaRPr lang="en-AU" dirty="0">
-              <a:latin typeface="Arial Black" panose="020B0A04020102020204" pitchFamily="34" charset="0"/>
-              <a:cs typeface="Arial" panose="020B0604020202020204" pitchFamily="34" charset="0"/>
-            </a:endParaRPr>
-          </a:p>
-        </p:txBody>
-      </p:sp>
-      <p:sp>
-        <p:nvSpPr>
-          <p:cNvPr id="3" name="Content Placeholder 2">
-            <a:extLst>
-              <a:ext uri="{FF2B5EF4-FFF2-40B4-BE49-F238E27FC236}">
-                <a16:creationId xmlns:a16="http://schemas.microsoft.com/office/drawing/2014/main" id="{1FC73FFB-3262-4C4C-86D4-65999A415573}"/>
-              </a:ext>
-            </a:extLst>
-          </p:cNvPr>
-          <p:cNvSpPr>
-            <a:spLocks noGrp="1"/>
-          </p:cNvSpPr>
-          <p:nvPr>
-            <p:ph idx="1"/>
-          </p:nvPr>
-        </p:nvSpPr>
-        <p:spPr>
-          <a:xfrm>
-            <a:off x="-434339" y="1464310"/>
-            <a:ext cx="6518910" cy="3987800"/>
-          </a:xfrm>
-        </p:spPr>
-        <p:txBody>
-          <a:bodyPr>
-            <a:normAutofit/>
-          </a:bodyPr>
-          <a:lstStyle/>
-          <a:p>
-            <a:pPr marL="457200" lvl="1" indent="0">
-              <a:buNone/>
-            </a:pPr>
-            <a:r>
-              <a:rPr lang="en-US" dirty="0">
-                <a:latin typeface="Arial" panose="020B0604020202020204" pitchFamily="34" charset="0"/>
-                <a:cs typeface="Arial" panose="020B0604020202020204" pitchFamily="34" charset="0"/>
-              </a:rPr>
-              <a:t>Angus</a:t>
-            </a:r>
-          </a:p>
-          <a:p>
-            <a:pPr lvl="2"/>
-            <a:r>
-              <a:rPr lang="en-US" dirty="0">
-                <a:latin typeface="Arial" panose="020B0604020202020204" pitchFamily="34" charset="0"/>
-                <a:cs typeface="Arial" panose="020B0604020202020204" pitchFamily="34" charset="0"/>
-              </a:rPr>
-              <a:t>A</a:t>
-            </a:r>
-          </a:p>
-          <a:p>
-            <a:pPr lvl="2"/>
-            <a:r>
-              <a:rPr lang="en-US" dirty="0">
-                <a:latin typeface="Arial" panose="020B0604020202020204" pitchFamily="34" charset="0"/>
-                <a:cs typeface="Arial" panose="020B0604020202020204" pitchFamily="34" charset="0"/>
-              </a:rPr>
-              <a:t>B</a:t>
-            </a:r>
-          </a:p>
-          <a:p>
-            <a:pPr lvl="2"/>
-            <a:r>
-              <a:rPr lang="en-US" dirty="0">
-                <a:latin typeface="Arial" panose="020B0604020202020204" pitchFamily="34" charset="0"/>
-                <a:cs typeface="Arial" panose="020B0604020202020204" pitchFamily="34" charset="0"/>
-              </a:rPr>
-              <a:t>C</a:t>
-            </a:r>
-          </a:p>
-          <a:p>
-            <a:pPr lvl="2"/>
-            <a:endParaRPr lang="en-US" dirty="0">
-              <a:latin typeface="Arial" panose="020B0604020202020204" pitchFamily="34" charset="0"/>
-              <a:cs typeface="Arial" panose="020B0604020202020204" pitchFamily="34" charset="0"/>
-            </a:endParaRPr>
-          </a:p>
-          <a:p>
-            <a:pPr marL="457200" lvl="1" indent="0">
-              <a:buNone/>
-            </a:pPr>
-            <a:r>
-              <a:rPr lang="en-US" dirty="0">
-                <a:latin typeface="Arial" panose="020B0604020202020204" pitchFamily="34" charset="0"/>
-                <a:cs typeface="Arial" panose="020B0604020202020204" pitchFamily="34" charset="0"/>
-              </a:rPr>
-              <a:t>Declan</a:t>
-            </a:r>
-          </a:p>
-          <a:p>
-            <a:pPr lvl="2"/>
-            <a:r>
-              <a:rPr lang="en-US" dirty="0">
-                <a:latin typeface="Arial" panose="020B0604020202020204" pitchFamily="34" charset="0"/>
-                <a:cs typeface="Arial" panose="020B0604020202020204" pitchFamily="34" charset="0"/>
-              </a:rPr>
-              <a:t>A</a:t>
-            </a:r>
-          </a:p>
-          <a:p>
-            <a:pPr lvl="2"/>
-            <a:r>
-              <a:rPr lang="en-US" dirty="0">
-                <a:latin typeface="Arial" panose="020B0604020202020204" pitchFamily="34" charset="0"/>
-                <a:cs typeface="Arial" panose="020B0604020202020204" pitchFamily="34" charset="0"/>
-              </a:rPr>
-              <a:t>B</a:t>
-            </a:r>
-          </a:p>
-          <a:p>
-            <a:pPr lvl="2"/>
-            <a:r>
-              <a:rPr lang="en-US" dirty="0">
-                <a:latin typeface="Arial" panose="020B0604020202020204" pitchFamily="34" charset="0"/>
-                <a:cs typeface="Arial" panose="020B0604020202020204" pitchFamily="34" charset="0"/>
-              </a:rPr>
-              <a:t>C</a:t>
-            </a:r>
-          </a:p>
-          <a:p>
-            <a:pPr lvl="2"/>
-            <a:r>
-              <a:rPr lang="en-US" dirty="0">
-                <a:latin typeface="Arial" panose="020B0604020202020204" pitchFamily="34" charset="0"/>
-                <a:cs typeface="Arial" panose="020B0604020202020204" pitchFamily="34" charset="0"/>
-              </a:rPr>
-              <a:t>D</a:t>
-            </a:r>
-          </a:p>
-          <a:p>
-            <a:pPr lvl="1"/>
-            <a:endParaRPr lang="en-US" dirty="0">
-              <a:latin typeface="Arial" panose="020B0604020202020204" pitchFamily="34" charset="0"/>
-              <a:cs typeface="Arial" panose="020B0604020202020204" pitchFamily="34" charset="0"/>
-            </a:endParaRPr>
-          </a:p>
-          <a:p>
-            <a:pPr lvl="1"/>
-            <a:endParaRPr lang="en-US" dirty="0">
-              <a:latin typeface="Arial" panose="020B0604020202020204" pitchFamily="34" charset="0"/>
-              <a:cs typeface="Arial" panose="020B0604020202020204" pitchFamily="34" charset="0"/>
-            </a:endParaRPr>
-          </a:p>
-        </p:txBody>
-      </p:sp>
-      <p:sp>
-        <p:nvSpPr>
-          <p:cNvPr id="16" name="Content Placeholder 2">
-            <a:extLst>
-              <a:ext uri="{FF2B5EF4-FFF2-40B4-BE49-F238E27FC236}">
-                <a16:creationId xmlns:a16="http://schemas.microsoft.com/office/drawing/2014/main" id="{D54A1C3C-5CCB-414C-86AB-3D589E299A9A}"/>
+                <a16:creationId xmlns:a16="http://schemas.microsoft.com/office/drawing/2014/main" id="{420B7E8E-FA86-4967-9A7A-C2E0496E7079}"/>
               </a:ext>
             </a:extLst>
           </p:cNvPr>
@@ -8217,8 +7995,8 @@
         </p:nvSpPr>
         <p:spPr>
           <a:xfrm>
-            <a:off x="6037020" y="1565901"/>
-            <a:ext cx="6154980" cy="5228273"/>
+            <a:off x="7561421" y="2296476"/>
+            <a:ext cx="4722496" cy="4917119"/>
           </a:xfrm>
           <a:prstGeom prst="rect">
             <a:avLst/>
@@ -8393,6 +8171,845 @@
             </a:lvl9pPr>
           </a:lstStyle>
           <a:p>
+            <a:r>
+              <a:rPr lang="en-AU" dirty="0" err="1"/>
+              <a:t>Eslint</a:t>
+            </a:r>
+            <a:endParaRPr lang="en-AU" dirty="0"/>
+          </a:p>
+          <a:p>
+            <a:r>
+              <a:rPr lang="en-AU" dirty="0"/>
+              <a:t>Travis</a:t>
+            </a:r>
+          </a:p>
+          <a:p>
+            <a:r>
+              <a:rPr lang="en-AU" dirty="0"/>
+              <a:t>Schema</a:t>
+            </a:r>
+          </a:p>
+          <a:p>
+            <a:r>
+              <a:rPr lang="en-AU" dirty="0" err="1"/>
+              <a:t>Unirest</a:t>
+            </a:r>
+            <a:endParaRPr lang="en-AU" dirty="0"/>
+          </a:p>
+          <a:p>
+            <a:r>
+              <a:rPr lang="en-AU" dirty="0"/>
+              <a:t>New Package</a:t>
+            </a:r>
+          </a:p>
+          <a:p>
+            <a:r>
+              <a:rPr lang="en-AU" dirty="0"/>
+              <a:t>GET, POST</a:t>
+            </a:r>
+          </a:p>
+          <a:p>
+            <a:r>
+              <a:rPr lang="en-AU" dirty="0"/>
+              <a:t>Love-Calculator API: rapidapi.com</a:t>
+            </a:r>
+          </a:p>
+          <a:p>
+            <a:r>
+              <a:rPr lang="en-AU" dirty="0"/>
+              <a:t>Pokémon API – pokeapi.co</a:t>
+            </a:r>
+            <a:endParaRPr lang="en-US" dirty="0">
+              <a:latin typeface="Arial" panose="020B0604020202020204" pitchFamily="34" charset="0"/>
+              <a:cs typeface="Arial" panose="020B0604020202020204" pitchFamily="34" charset="0"/>
+            </a:endParaRPr>
+          </a:p>
+          <a:p>
+            <a:pPr lvl="1"/>
+            <a:endParaRPr lang="en-US" dirty="0">
+              <a:latin typeface="Arial" panose="020B0604020202020204" pitchFamily="34" charset="0"/>
+              <a:cs typeface="Arial" panose="020B0604020202020204" pitchFamily="34" charset="0"/>
+            </a:endParaRPr>
+          </a:p>
+          <a:p>
+            <a:pPr lvl="1"/>
+            <a:endParaRPr lang="en-US" dirty="0">
+              <a:latin typeface="Arial" panose="020B0604020202020204" pitchFamily="34" charset="0"/>
+              <a:cs typeface="Arial" panose="020B0604020202020204" pitchFamily="34" charset="0"/>
+            </a:endParaRPr>
+          </a:p>
+        </p:txBody>
+      </p:sp>
+    </p:spTree>
+    <p:extLst>
+      <p:ext uri="{BB962C8B-B14F-4D97-AF65-F5344CB8AC3E}">
+        <p14:creationId xmlns:p14="http://schemas.microsoft.com/office/powerpoint/2010/main" val="1104210967"/>
+      </p:ext>
+    </p:extLst>
+  </p:cSld>
+  <p:clrMapOvr>
+    <a:masterClrMapping/>
+  </p:clrMapOvr>
+  <p:timing>
+    <p:tnLst>
+      <p:par>
+        <p:cTn id="1" dur="indefinite" restart="never" nodeType="tmRoot">
+          <p:childTnLst>
+            <p:seq concurrent="1" nextAc="seek">
+              <p:cTn id="2" dur="indefinite" nodeType="mainSeq">
+                <p:childTnLst>
+                  <p:par>
+                    <p:cTn id="3" fill="hold">
+                      <p:stCondLst>
+                        <p:cond delay="indefinite"/>
+                        <p:cond evt="onBegin" delay="0">
+                          <p:tn val="2"/>
+                        </p:cond>
+                      </p:stCondLst>
+                      <p:childTnLst>
+                        <p:par>
+                          <p:cTn id="4" fill="hold">
+                            <p:stCondLst>
+                              <p:cond delay="0"/>
+                            </p:stCondLst>
+                            <p:childTnLst>
+                              <p:par>
+                                <p:cTn id="5" presetID="2" presetClass="entr" presetSubtype="8" fill="hold" nodeType="afterEffect">
+                                  <p:stCondLst>
+                                    <p:cond delay="1000"/>
+                                  </p:stCondLst>
+                                  <p:childTnLst>
+                                    <p:set>
+                                      <p:cBhvr>
+                                        <p:cTn id="6" dur="1" fill="hold">
+                                          <p:stCondLst>
+                                            <p:cond delay="0"/>
+                                          </p:stCondLst>
+                                        </p:cTn>
+                                        <p:tgtEl>
+                                          <p:spTgt spid="13"/>
+                                        </p:tgtEl>
+                                        <p:attrNameLst>
+                                          <p:attrName>style.visibility</p:attrName>
+                                        </p:attrNameLst>
+                                      </p:cBhvr>
+                                      <p:to>
+                                        <p:strVal val="visible"/>
+                                      </p:to>
+                                    </p:set>
+                                    <p:anim calcmode="lin" valueType="num">
+                                      <p:cBhvr additive="base">
+                                        <p:cTn id="7" dur="1000" fill="hold"/>
+                                        <p:tgtEl>
+                                          <p:spTgt spid="13"/>
+                                        </p:tgtEl>
+                                        <p:attrNameLst>
+                                          <p:attrName>ppt_x</p:attrName>
+                                        </p:attrNameLst>
+                                      </p:cBhvr>
+                                      <p:tavLst>
+                                        <p:tav tm="0">
+                                          <p:val>
+                                            <p:strVal val="0-#ppt_w/2"/>
+                                          </p:val>
+                                        </p:tav>
+                                        <p:tav tm="100000">
+                                          <p:val>
+                                            <p:strVal val="#ppt_x"/>
+                                          </p:val>
+                                        </p:tav>
+                                      </p:tavLst>
+                                    </p:anim>
+                                    <p:anim calcmode="lin" valueType="num">
+                                      <p:cBhvr additive="base">
+                                        <p:cTn id="8" dur="1000" fill="hold"/>
+                                        <p:tgtEl>
+                                          <p:spTgt spid="13"/>
+                                        </p:tgtEl>
+                                        <p:attrNameLst>
+                                          <p:attrName>ppt_y</p:attrName>
+                                        </p:attrNameLst>
+                                      </p:cBhvr>
+                                      <p:tavLst>
+                                        <p:tav tm="0">
+                                          <p:val>
+                                            <p:strVal val="#ppt_y"/>
+                                          </p:val>
+                                        </p:tav>
+                                        <p:tav tm="100000">
+                                          <p:val>
+                                            <p:strVal val="#ppt_y"/>
+                                          </p:val>
+                                        </p:tav>
+                                      </p:tavLst>
+                                    </p:anim>
+                                  </p:childTnLst>
+                                </p:cTn>
+                              </p:par>
+                            </p:childTnLst>
+                          </p:cTn>
+                        </p:par>
+                      </p:childTnLst>
+                    </p:cTn>
+                  </p:par>
+                </p:childTnLst>
+              </p:cTn>
+              <p:prevCondLst>
+                <p:cond evt="onPrev" delay="0">
+                  <p:tgtEl>
+                    <p:sldTgt/>
+                  </p:tgtEl>
+                </p:cond>
+              </p:prevCondLst>
+              <p:nextCondLst>
+                <p:cond evt="onNext" delay="0">
+                  <p:tgtEl>
+                    <p:sldTgt/>
+                  </p:tgtEl>
+                </p:cond>
+              </p:nextCondLst>
+            </p:seq>
+          </p:childTnLst>
+        </p:cTn>
+      </p:par>
+    </p:tnLst>
+  </p:timing>
+</p:sld>
+</file>
+
+<file path=ppt/slides/slide6.xml><?xml version="1.0" encoding="utf-8"?>
+<p:sld xmlns:a="http://schemas.openxmlformats.org/drawingml/2006/main" xmlns:r="http://schemas.openxmlformats.org/officeDocument/2006/relationships" xmlns:p="http://schemas.openxmlformats.org/presentationml/2006/main">
+  <p:cSld>
+    <p:spTree>
+      <p:nvGrpSpPr>
+        <p:cNvPr id="1" name=""/>
+        <p:cNvGrpSpPr/>
+        <p:nvPr/>
+      </p:nvGrpSpPr>
+      <p:grpSpPr>
+        <a:xfrm>
+          <a:off x="0" y="0"/>
+          <a:ext cx="0" cy="0"/>
+          <a:chOff x="0" y="0"/>
+          <a:chExt cx="0" cy="0"/>
+        </a:xfrm>
+      </p:grpSpPr>
+      <p:sp>
+        <p:nvSpPr>
+          <p:cNvPr id="17" name="Rectangle 16">
+            <a:extLst>
+              <a:ext uri="{FF2B5EF4-FFF2-40B4-BE49-F238E27FC236}">
+                <a16:creationId xmlns:a16="http://schemas.microsoft.com/office/drawing/2014/main" id="{E023F43E-14BD-4FDA-B8AA-2801F0F8788E}"/>
+              </a:ext>
+            </a:extLst>
+          </p:cNvPr>
+          <p:cNvSpPr/>
+          <p:nvPr/>
+        </p:nvSpPr>
+        <p:spPr>
+          <a:xfrm>
+            <a:off x="0" y="-1"/>
+            <a:ext cx="12192000" cy="1383023"/>
+          </a:xfrm>
+          <a:prstGeom prst="rect">
+            <a:avLst/>
+          </a:prstGeom>
+          <a:solidFill>
+            <a:srgbClr val="FFCCCC"/>
+          </a:solidFill>
+          <a:ln>
+            <a:noFill/>
+          </a:ln>
+        </p:spPr>
+        <p:style>
+          <a:lnRef idx="2">
+            <a:schemeClr val="accent1">
+              <a:shade val="50000"/>
+            </a:schemeClr>
+          </a:lnRef>
+          <a:fillRef idx="1">
+            <a:schemeClr val="accent1"/>
+          </a:fillRef>
+          <a:effectRef idx="0">
+            <a:schemeClr val="accent1"/>
+          </a:effectRef>
+          <a:fontRef idx="minor">
+            <a:schemeClr val="lt1"/>
+          </a:fontRef>
+        </p:style>
+        <p:txBody>
+          <a:bodyPr rtlCol="0" anchor="ctr"/>
+          <a:lstStyle/>
+          <a:p>
+            <a:pPr algn="ctr"/>
+            <a:endParaRPr lang="en-AU">
+              <a:solidFill>
+                <a:srgbClr val="FFCCCC"/>
+              </a:solidFill>
+            </a:endParaRPr>
+          </a:p>
+        </p:txBody>
+      </p:sp>
+      <p:grpSp>
+        <p:nvGrpSpPr>
+          <p:cNvPr id="18" name="Group 17">
+            <a:extLst>
+              <a:ext uri="{FF2B5EF4-FFF2-40B4-BE49-F238E27FC236}">
+                <a16:creationId xmlns:a16="http://schemas.microsoft.com/office/drawing/2014/main" id="{F157B295-7522-4145-A529-E3AAD31A20B1}"/>
+              </a:ext>
+            </a:extLst>
+          </p:cNvPr>
+          <p:cNvGrpSpPr/>
+          <p:nvPr/>
+        </p:nvGrpSpPr>
+        <p:grpSpPr>
+          <a:xfrm>
+            <a:off x="0" y="901065"/>
+            <a:ext cx="12192000" cy="963930"/>
+            <a:chOff x="0" y="1175385"/>
+            <a:chExt cx="12192000" cy="963930"/>
+          </a:xfrm>
+        </p:grpSpPr>
+        <p:cxnSp>
+          <p:nvCxnSpPr>
+            <p:cNvPr id="19" name="Straight Connector 18">
+              <a:extLst>
+                <a:ext uri="{FF2B5EF4-FFF2-40B4-BE49-F238E27FC236}">
+                  <a16:creationId xmlns:a16="http://schemas.microsoft.com/office/drawing/2014/main" id="{6463D5A2-89FD-4DB8-B8D4-EA47690B46B8}"/>
+                </a:ext>
+              </a:extLst>
+            </p:cNvPr>
+            <p:cNvCxnSpPr/>
+            <p:nvPr/>
+          </p:nvCxnSpPr>
+          <p:spPr>
+            <a:xfrm>
+              <a:off x="0" y="1657350"/>
+              <a:ext cx="12192000" cy="0"/>
+            </a:xfrm>
+            <a:prstGeom prst="line">
+              <a:avLst/>
+            </a:prstGeom>
+            <a:ln w="127000">
+              <a:solidFill>
+                <a:schemeClr val="tx1"/>
+              </a:solidFill>
+            </a:ln>
+          </p:spPr>
+          <p:style>
+            <a:lnRef idx="1">
+              <a:schemeClr val="accent1"/>
+            </a:lnRef>
+            <a:fillRef idx="0">
+              <a:schemeClr val="accent1"/>
+            </a:fillRef>
+            <a:effectRef idx="0">
+              <a:schemeClr val="accent1"/>
+            </a:effectRef>
+            <a:fontRef idx="minor">
+              <a:schemeClr val="tx1"/>
+            </a:fontRef>
+          </p:style>
+        </p:cxnSp>
+        <p:sp>
+          <p:nvSpPr>
+            <p:cNvPr id="20" name="Oval 19">
+              <a:extLst>
+                <a:ext uri="{FF2B5EF4-FFF2-40B4-BE49-F238E27FC236}">
+                  <a16:creationId xmlns:a16="http://schemas.microsoft.com/office/drawing/2014/main" id="{6E08FFDA-FE06-4AD2-B50A-3CBFB908021B}"/>
+                </a:ext>
+              </a:extLst>
+            </p:cNvPr>
+            <p:cNvSpPr/>
+            <p:nvPr/>
+          </p:nvSpPr>
+          <p:spPr>
+            <a:xfrm>
+              <a:off x="5614035" y="1175385"/>
+              <a:ext cx="963930" cy="963930"/>
+            </a:xfrm>
+            <a:prstGeom prst="ellipse">
+              <a:avLst/>
+            </a:prstGeom>
+            <a:solidFill>
+              <a:schemeClr val="bg1"/>
+            </a:solidFill>
+            <a:ln w="76200">
+              <a:solidFill>
+                <a:schemeClr val="tx1"/>
+              </a:solidFill>
+            </a:ln>
+          </p:spPr>
+          <p:style>
+            <a:lnRef idx="2">
+              <a:schemeClr val="accent1">
+                <a:shade val="50000"/>
+              </a:schemeClr>
+            </a:lnRef>
+            <a:fillRef idx="1">
+              <a:schemeClr val="accent1"/>
+            </a:fillRef>
+            <a:effectRef idx="0">
+              <a:schemeClr val="accent1"/>
+            </a:effectRef>
+            <a:fontRef idx="minor">
+              <a:schemeClr val="lt1"/>
+            </a:fontRef>
+          </p:style>
+          <p:txBody>
+            <a:bodyPr rtlCol="0" anchor="ctr"/>
+            <a:lstStyle/>
+            <a:p>
+              <a:pPr algn="ctr"/>
+              <a:endParaRPr lang="en-AU"/>
+            </a:p>
+          </p:txBody>
+        </p:sp>
+        <p:sp>
+          <p:nvSpPr>
+            <p:cNvPr id="21" name="Oval 20">
+              <a:extLst>
+                <a:ext uri="{FF2B5EF4-FFF2-40B4-BE49-F238E27FC236}">
+                  <a16:creationId xmlns:a16="http://schemas.microsoft.com/office/drawing/2014/main" id="{6CAA3F05-A145-4539-9AFC-D72D15504B6F}"/>
+                </a:ext>
+              </a:extLst>
+            </p:cNvPr>
+            <p:cNvSpPr/>
+            <p:nvPr/>
+          </p:nvSpPr>
+          <p:spPr>
+            <a:xfrm>
+              <a:off x="5778817" y="1340167"/>
+              <a:ext cx="634365" cy="634365"/>
+            </a:xfrm>
+            <a:prstGeom prst="ellipse">
+              <a:avLst/>
+            </a:prstGeom>
+            <a:solidFill>
+              <a:schemeClr val="bg1"/>
+            </a:solidFill>
+            <a:ln w="76200">
+              <a:solidFill>
+                <a:schemeClr val="tx1"/>
+              </a:solidFill>
+            </a:ln>
+          </p:spPr>
+          <p:style>
+            <a:lnRef idx="2">
+              <a:schemeClr val="accent1">
+                <a:shade val="50000"/>
+              </a:schemeClr>
+            </a:lnRef>
+            <a:fillRef idx="1">
+              <a:schemeClr val="accent1"/>
+            </a:fillRef>
+            <a:effectRef idx="0">
+              <a:schemeClr val="accent1"/>
+            </a:effectRef>
+            <a:fontRef idx="minor">
+              <a:schemeClr val="lt1"/>
+            </a:fontRef>
+          </p:style>
+          <p:txBody>
+            <a:bodyPr rtlCol="0" anchor="ctr"/>
+            <a:lstStyle/>
+            <a:p>
+              <a:pPr algn="ctr"/>
+              <a:endParaRPr lang="en-AU"/>
+            </a:p>
+          </p:txBody>
+        </p:sp>
+      </p:grpSp>
+      <p:sp>
+        <p:nvSpPr>
+          <p:cNvPr id="2" name="Title 1">
+            <a:extLst>
+              <a:ext uri="{FF2B5EF4-FFF2-40B4-BE49-F238E27FC236}">
+                <a16:creationId xmlns:a16="http://schemas.microsoft.com/office/drawing/2014/main" id="{0B2F6EA6-8BB2-4F7D-ABC9-16EECF9F8F97}"/>
+              </a:ext>
+            </a:extLst>
+          </p:cNvPr>
+          <p:cNvSpPr>
+            <a:spLocks noGrp="1"/>
+          </p:cNvSpPr>
+          <p:nvPr>
+            <p:ph type="title"/>
+          </p:nvPr>
+        </p:nvSpPr>
+        <p:spPr>
+          <a:xfrm>
+            <a:off x="388620" y="-164784"/>
+            <a:ext cx="11252349" cy="1325563"/>
+          </a:xfrm>
+        </p:spPr>
+        <p:txBody>
+          <a:bodyPr/>
+          <a:lstStyle/>
+          <a:p>
+            <a:r>
+              <a:rPr lang="en-US" dirty="0">
+                <a:latin typeface="Arial Black" panose="020B0A04020102020204" pitchFamily="34" charset="0"/>
+                <a:cs typeface="Arial" panose="020B0604020202020204" pitchFamily="34" charset="0"/>
+              </a:rPr>
+              <a:t>Process – </a:t>
+            </a:r>
+            <a:r>
+              <a:rPr lang="en-US" sz="4000" dirty="0">
+                <a:latin typeface="Arial Black" panose="020B0A04020102020204" pitchFamily="34" charset="0"/>
+                <a:cs typeface="Arial" panose="020B0604020202020204" pitchFamily="34" charset="0"/>
+              </a:rPr>
+              <a:t>Breakdown of tasks &amp; roles</a:t>
+            </a:r>
+            <a:endParaRPr lang="en-AU" dirty="0">
+              <a:latin typeface="Arial Black" panose="020B0A04020102020204" pitchFamily="34" charset="0"/>
+              <a:cs typeface="Arial" panose="020B0604020202020204" pitchFamily="34" charset="0"/>
+            </a:endParaRPr>
+          </a:p>
+        </p:txBody>
+      </p:sp>
+      <p:sp>
+        <p:nvSpPr>
+          <p:cNvPr id="3" name="Content Placeholder 2">
+            <a:extLst>
+              <a:ext uri="{FF2B5EF4-FFF2-40B4-BE49-F238E27FC236}">
+                <a16:creationId xmlns:a16="http://schemas.microsoft.com/office/drawing/2014/main" id="{1FC73FFB-3262-4C4C-86D4-65999A415573}"/>
+              </a:ext>
+            </a:extLst>
+          </p:cNvPr>
+          <p:cNvSpPr>
+            <a:spLocks noGrp="1"/>
+          </p:cNvSpPr>
+          <p:nvPr>
+            <p:ph idx="1"/>
+          </p:nvPr>
+        </p:nvSpPr>
+        <p:spPr>
+          <a:xfrm>
+            <a:off x="-434339" y="1464310"/>
+            <a:ext cx="6518910" cy="3987800"/>
+          </a:xfrm>
+        </p:spPr>
+        <p:txBody>
+          <a:bodyPr>
+            <a:normAutofit/>
+          </a:bodyPr>
+          <a:lstStyle/>
+          <a:p>
+            <a:pPr marL="457200" lvl="1" indent="0">
+              <a:buNone/>
+            </a:pPr>
+            <a:r>
+              <a:rPr lang="en-US" dirty="0">
+                <a:latin typeface="Arial" panose="020B0604020202020204" pitchFamily="34" charset="0"/>
+                <a:cs typeface="Arial" panose="020B0604020202020204" pitchFamily="34" charset="0"/>
+              </a:rPr>
+              <a:t>Angus</a:t>
+            </a:r>
+          </a:p>
+          <a:p>
+            <a:pPr lvl="2"/>
+            <a:r>
+              <a:rPr lang="en-US" dirty="0">
+                <a:latin typeface="Arial" panose="020B0604020202020204" pitchFamily="34" charset="0"/>
+                <a:cs typeface="Arial" panose="020B0604020202020204" pitchFamily="34" charset="0"/>
+              </a:rPr>
+              <a:t>Pokémon love descriptions</a:t>
+            </a:r>
+          </a:p>
+          <a:p>
+            <a:pPr lvl="2"/>
+            <a:r>
+              <a:rPr lang="en-US" dirty="0">
+                <a:latin typeface="Arial" panose="020B0604020202020204" pitchFamily="34" charset="0"/>
+                <a:cs typeface="Arial" panose="020B0604020202020204" pitchFamily="34" charset="0"/>
+              </a:rPr>
+              <a:t>Presentation PowerPoint</a:t>
+            </a:r>
+          </a:p>
+          <a:p>
+            <a:pPr lvl="2"/>
+            <a:r>
+              <a:rPr lang="en-US" dirty="0">
+                <a:latin typeface="Arial" panose="020B0604020202020204" pitchFamily="34" charset="0"/>
+                <a:cs typeface="Arial" panose="020B0604020202020204" pitchFamily="34" charset="0"/>
+              </a:rPr>
+              <a:t>Concept &amp; Documentation</a:t>
+            </a:r>
+          </a:p>
+          <a:p>
+            <a:pPr lvl="2"/>
+            <a:endParaRPr lang="en-US" dirty="0">
+              <a:latin typeface="Arial" panose="020B0604020202020204" pitchFamily="34" charset="0"/>
+              <a:cs typeface="Arial" panose="020B0604020202020204" pitchFamily="34" charset="0"/>
+            </a:endParaRPr>
+          </a:p>
+          <a:p>
+            <a:pPr marL="457200" lvl="1" indent="0">
+              <a:buNone/>
+            </a:pPr>
+            <a:r>
+              <a:rPr lang="en-US" sz="2000" dirty="0">
+                <a:latin typeface="Arial" panose="020B0604020202020204" pitchFamily="34" charset="0"/>
+                <a:cs typeface="Arial" panose="020B0604020202020204" pitchFamily="34" charset="0"/>
+              </a:rPr>
+              <a:t>Declan</a:t>
+            </a:r>
+          </a:p>
+          <a:p>
+            <a:pPr lvl="2"/>
+            <a:r>
+              <a:rPr lang="en-US" dirty="0" err="1">
+                <a:latin typeface="Arial" panose="020B0604020202020204" pitchFamily="34" charset="0"/>
+                <a:cs typeface="Arial" panose="020B0604020202020204" pitchFamily="34" charset="0"/>
+              </a:rPr>
+              <a:t>Unirest</a:t>
+            </a:r>
+            <a:r>
+              <a:rPr lang="en-US" dirty="0">
+                <a:latin typeface="Arial" panose="020B0604020202020204" pitchFamily="34" charset="0"/>
+                <a:cs typeface="Arial" panose="020B0604020202020204" pitchFamily="34" charset="0"/>
+              </a:rPr>
+              <a:t> API calls</a:t>
+            </a:r>
+          </a:p>
+          <a:p>
+            <a:pPr lvl="2"/>
+            <a:r>
+              <a:rPr lang="en-US" dirty="0">
+                <a:latin typeface="Arial" panose="020B0604020202020204" pitchFamily="34" charset="0"/>
+                <a:cs typeface="Arial" panose="020B0604020202020204" pitchFamily="34" charset="0"/>
+              </a:rPr>
+              <a:t>Routing</a:t>
+            </a:r>
+          </a:p>
+          <a:p>
+            <a:pPr lvl="2"/>
+            <a:r>
+              <a:rPr lang="en-US" dirty="0">
+                <a:latin typeface="Arial" panose="020B0604020202020204" pitchFamily="34" charset="0"/>
+                <a:cs typeface="Arial" panose="020B0604020202020204" pitchFamily="34" charset="0"/>
+              </a:rPr>
+              <a:t>Backend JS (Node/Express)</a:t>
+            </a:r>
+          </a:p>
+          <a:p>
+            <a:pPr lvl="2"/>
+            <a:r>
+              <a:rPr lang="en-US" dirty="0">
+                <a:latin typeface="Arial" panose="020B0604020202020204" pitchFamily="34" charset="0"/>
+                <a:cs typeface="Arial" panose="020B0604020202020204" pitchFamily="34" charset="0"/>
+              </a:rPr>
+              <a:t>Data storage</a:t>
+            </a:r>
+          </a:p>
+          <a:p>
+            <a:pPr lvl="1"/>
+            <a:endParaRPr lang="en-US" dirty="0">
+              <a:latin typeface="Arial" panose="020B0604020202020204" pitchFamily="34" charset="0"/>
+              <a:cs typeface="Arial" panose="020B0604020202020204" pitchFamily="34" charset="0"/>
+            </a:endParaRPr>
+          </a:p>
+          <a:p>
+            <a:pPr lvl="1"/>
+            <a:endParaRPr lang="en-US" dirty="0">
+              <a:latin typeface="Arial" panose="020B0604020202020204" pitchFamily="34" charset="0"/>
+              <a:cs typeface="Arial" panose="020B0604020202020204" pitchFamily="34" charset="0"/>
+            </a:endParaRPr>
+          </a:p>
+        </p:txBody>
+      </p:sp>
+      <p:sp>
+        <p:nvSpPr>
+          <p:cNvPr id="16" name="Content Placeholder 2">
+            <a:extLst>
+              <a:ext uri="{FF2B5EF4-FFF2-40B4-BE49-F238E27FC236}">
+                <a16:creationId xmlns:a16="http://schemas.microsoft.com/office/drawing/2014/main" id="{D54A1C3C-5CCB-414C-86AB-3D589E299A9A}"/>
+              </a:ext>
+            </a:extLst>
+          </p:cNvPr>
+          <p:cNvSpPr txBox="1">
+            <a:spLocks/>
+          </p:cNvSpPr>
+          <p:nvPr/>
+        </p:nvSpPr>
+        <p:spPr>
+          <a:xfrm>
+            <a:off x="6037020" y="1565901"/>
+            <a:ext cx="6154980" cy="5441952"/>
+          </a:xfrm>
+          <a:prstGeom prst="rect">
+            <a:avLst/>
+          </a:prstGeom>
+        </p:spPr>
+        <p:txBody>
+          <a:bodyPr vert="horz" lIns="91440" tIns="45720" rIns="91440" bIns="45720" rtlCol="0">
+            <a:normAutofit/>
+          </a:bodyPr>
+          <a:lstStyle>
+            <a:lvl1pPr marL="228600" indent="-228600" algn="l" defTabSz="914400" rtl="0" eaLnBrk="1" latinLnBrk="0" hangingPunct="1">
+              <a:lnSpc>
+                <a:spcPct val="90000"/>
+              </a:lnSpc>
+              <a:spcBef>
+                <a:spcPts val="1000"/>
+              </a:spcBef>
+              <a:buFont typeface="Arial" panose="020B0604020202020204" pitchFamily="34" charset="0"/>
+              <a:buChar char="•"/>
+              <a:defRPr sz="2800" kern="1200">
+                <a:solidFill>
+                  <a:schemeClr val="tx1"/>
+                </a:solidFill>
+                <a:latin typeface="+mn-lt"/>
+                <a:ea typeface="+mn-ea"/>
+                <a:cs typeface="+mn-cs"/>
+              </a:defRPr>
+            </a:lvl1pPr>
+            <a:lvl2pPr marL="685800" indent="-228600" algn="l" defTabSz="914400" rtl="0" eaLnBrk="1" latinLnBrk="0" hangingPunct="1">
+              <a:lnSpc>
+                <a:spcPct val="90000"/>
+              </a:lnSpc>
+              <a:spcBef>
+                <a:spcPts val="500"/>
+              </a:spcBef>
+              <a:buFont typeface="Arial" panose="020B0604020202020204" pitchFamily="34" charset="0"/>
+              <a:buChar char="•"/>
+              <a:defRPr sz="2400" kern="1200">
+                <a:solidFill>
+                  <a:schemeClr val="tx1"/>
+                </a:solidFill>
+                <a:latin typeface="+mn-lt"/>
+                <a:ea typeface="+mn-ea"/>
+                <a:cs typeface="+mn-cs"/>
+              </a:defRPr>
+            </a:lvl2pPr>
+            <a:lvl3pPr marL="1143000" indent="-228600" algn="l" defTabSz="914400" rtl="0" eaLnBrk="1" latinLnBrk="0" hangingPunct="1">
+              <a:lnSpc>
+                <a:spcPct val="90000"/>
+              </a:lnSpc>
+              <a:spcBef>
+                <a:spcPts val="500"/>
+              </a:spcBef>
+              <a:buFont typeface="Arial" panose="020B0604020202020204" pitchFamily="34" charset="0"/>
+              <a:buChar char="•"/>
+              <a:defRPr sz="2000" kern="1200">
+                <a:solidFill>
+                  <a:schemeClr val="tx1"/>
+                </a:solidFill>
+                <a:latin typeface="+mn-lt"/>
+                <a:ea typeface="+mn-ea"/>
+                <a:cs typeface="+mn-cs"/>
+              </a:defRPr>
+            </a:lvl3pPr>
+            <a:lvl4pPr marL="1600200" indent="-228600" algn="l" defTabSz="914400" rtl="0" eaLnBrk="1" latinLnBrk="0" hangingPunct="1">
+              <a:lnSpc>
+                <a:spcPct val="90000"/>
+              </a:lnSpc>
+              <a:spcBef>
+                <a:spcPts val="500"/>
+              </a:spcBef>
+              <a:buFont typeface="Arial" panose="020B0604020202020204" pitchFamily="34" charset="0"/>
+              <a:buChar char="•"/>
+              <a:defRPr sz="1800" kern="1200">
+                <a:solidFill>
+                  <a:schemeClr val="tx1"/>
+                </a:solidFill>
+                <a:latin typeface="+mn-lt"/>
+                <a:ea typeface="+mn-ea"/>
+                <a:cs typeface="+mn-cs"/>
+              </a:defRPr>
+            </a:lvl4pPr>
+            <a:lvl5pPr marL="2057400" indent="-228600" algn="l" defTabSz="914400" rtl="0" eaLnBrk="1" latinLnBrk="0" hangingPunct="1">
+              <a:lnSpc>
+                <a:spcPct val="90000"/>
+              </a:lnSpc>
+              <a:spcBef>
+                <a:spcPts val="500"/>
+              </a:spcBef>
+              <a:buFont typeface="Arial" panose="020B0604020202020204" pitchFamily="34" charset="0"/>
+              <a:buChar char="•"/>
+              <a:defRPr sz="1800" kern="1200">
+                <a:solidFill>
+                  <a:schemeClr val="tx1"/>
+                </a:solidFill>
+                <a:latin typeface="+mn-lt"/>
+                <a:ea typeface="+mn-ea"/>
+                <a:cs typeface="+mn-cs"/>
+              </a:defRPr>
+            </a:lvl5pPr>
+            <a:lvl6pPr marL="2514600" indent="-228600" algn="l" defTabSz="914400" rtl="0" eaLnBrk="1" latinLnBrk="0" hangingPunct="1">
+              <a:lnSpc>
+                <a:spcPct val="90000"/>
+              </a:lnSpc>
+              <a:spcBef>
+                <a:spcPts val="500"/>
+              </a:spcBef>
+              <a:buFont typeface="Arial" panose="020B0604020202020204" pitchFamily="34" charset="0"/>
+              <a:buChar char="•"/>
+              <a:defRPr sz="1800" kern="1200">
+                <a:solidFill>
+                  <a:schemeClr val="tx1"/>
+                </a:solidFill>
+                <a:latin typeface="+mn-lt"/>
+                <a:ea typeface="+mn-ea"/>
+                <a:cs typeface="+mn-cs"/>
+              </a:defRPr>
+            </a:lvl6pPr>
+            <a:lvl7pPr marL="2971800" indent="-228600" algn="l" defTabSz="914400" rtl="0" eaLnBrk="1" latinLnBrk="0" hangingPunct="1">
+              <a:lnSpc>
+                <a:spcPct val="90000"/>
+              </a:lnSpc>
+              <a:spcBef>
+                <a:spcPts val="500"/>
+              </a:spcBef>
+              <a:buFont typeface="Arial" panose="020B0604020202020204" pitchFamily="34" charset="0"/>
+              <a:buChar char="•"/>
+              <a:defRPr sz="1800" kern="1200">
+                <a:solidFill>
+                  <a:schemeClr val="tx1"/>
+                </a:solidFill>
+                <a:latin typeface="+mn-lt"/>
+                <a:ea typeface="+mn-ea"/>
+                <a:cs typeface="+mn-cs"/>
+              </a:defRPr>
+            </a:lvl7pPr>
+            <a:lvl8pPr marL="3429000" indent="-228600" algn="l" defTabSz="914400" rtl="0" eaLnBrk="1" latinLnBrk="0" hangingPunct="1">
+              <a:lnSpc>
+                <a:spcPct val="90000"/>
+              </a:lnSpc>
+              <a:spcBef>
+                <a:spcPts val="500"/>
+              </a:spcBef>
+              <a:buFont typeface="Arial" panose="020B0604020202020204" pitchFamily="34" charset="0"/>
+              <a:buChar char="•"/>
+              <a:defRPr sz="1800" kern="1200">
+                <a:solidFill>
+                  <a:schemeClr val="tx1"/>
+                </a:solidFill>
+                <a:latin typeface="+mn-lt"/>
+                <a:ea typeface="+mn-ea"/>
+                <a:cs typeface="+mn-cs"/>
+              </a:defRPr>
+            </a:lvl8pPr>
+            <a:lvl9pPr marL="3886200" indent="-228600" algn="l" defTabSz="914400" rtl="0" eaLnBrk="1" latinLnBrk="0" hangingPunct="1">
+              <a:lnSpc>
+                <a:spcPct val="90000"/>
+              </a:lnSpc>
+              <a:spcBef>
+                <a:spcPts val="500"/>
+              </a:spcBef>
+              <a:buFont typeface="Arial" panose="020B0604020202020204" pitchFamily="34" charset="0"/>
+              <a:buChar char="•"/>
+              <a:defRPr sz="1800" kern="1200">
+                <a:solidFill>
+                  <a:schemeClr val="tx1"/>
+                </a:solidFill>
+                <a:latin typeface="+mn-lt"/>
+                <a:ea typeface="+mn-ea"/>
+                <a:cs typeface="+mn-cs"/>
+              </a:defRPr>
+            </a:lvl9pPr>
+          </a:lstStyle>
+          <a:p>
             <a:pPr marL="457200" lvl="1" indent="0">
               <a:buNone/>
             </a:pPr>
@@ -8411,7 +9028,7 @@
                 <a:latin typeface="Arial" panose="020B0604020202020204" pitchFamily="34" charset="0"/>
                 <a:cs typeface="Arial" panose="020B0604020202020204" pitchFamily="34" charset="0"/>
               </a:rPr>
-              <a:t>A</a:t>
+              <a:t>Schema</a:t>
             </a:r>
           </a:p>
           <a:p>
@@ -8421,7 +9038,7 @@
                 <a:latin typeface="Arial" panose="020B0604020202020204" pitchFamily="34" charset="0"/>
                 <a:cs typeface="Arial" panose="020B0604020202020204" pitchFamily="34" charset="0"/>
               </a:rPr>
-              <a:t>B</a:t>
+              <a:t>Handlebars</a:t>
             </a:r>
           </a:p>
           <a:p>
@@ -8431,7 +9048,7 @@
                 <a:latin typeface="Arial" panose="020B0604020202020204" pitchFamily="34" charset="0"/>
                 <a:cs typeface="Arial" panose="020B0604020202020204" pitchFamily="34" charset="0"/>
               </a:rPr>
-              <a:t>C</a:t>
+              <a:t>Database</a:t>
             </a:r>
           </a:p>
           <a:p>
@@ -8462,7 +9079,7 @@
                 <a:latin typeface="Arial" panose="020B0604020202020204" pitchFamily="34" charset="0"/>
                 <a:cs typeface="Arial" panose="020B0604020202020204" pitchFamily="34" charset="0"/>
               </a:rPr>
-              <a:t>HTML Layout</a:t>
+              <a:t>Page layout design &amp; </a:t>
             </a:r>
           </a:p>
           <a:p>
@@ -8472,7 +9089,7 @@
                 <a:latin typeface="Arial" panose="020B0604020202020204" pitchFamily="34" charset="0"/>
                 <a:cs typeface="Arial" panose="020B0604020202020204" pitchFamily="34" charset="0"/>
               </a:rPr>
-              <a:t>CSS</a:t>
+              <a:t>HTML</a:t>
             </a:r>
           </a:p>
           <a:p>
@@ -8482,11 +9099,13 @@
                 <a:latin typeface="Arial" panose="020B0604020202020204" pitchFamily="34" charset="0"/>
                 <a:cs typeface="Arial" panose="020B0604020202020204" pitchFamily="34" charset="0"/>
               </a:rPr>
-              <a:t>C</a:t>
-            </a:r>
-          </a:p>
-          <a:p>
-            <a:pPr lvl="2"/>
+              <a:t>CSS &amp; Bootstrap</a:t>
+            </a:r>
+          </a:p>
+          <a:p>
+            <a:pPr marL="914400" lvl="2" indent="0">
+              <a:buNone/>
+            </a:pPr>
             <a:endParaRPr lang="en-US" dirty="0">
               <a:latin typeface="Arial" panose="020B0604020202020204" pitchFamily="34" charset="0"/>
               <a:cs typeface="Arial" panose="020B0604020202020204" pitchFamily="34" charset="0"/>
@@ -8511,7 +9130,7 @@
                 <a:latin typeface="Arial" panose="020B0604020202020204" pitchFamily="34" charset="0"/>
                 <a:cs typeface="Arial" panose="020B0604020202020204" pitchFamily="34" charset="0"/>
               </a:rPr>
-              <a:t>A</a:t>
+              <a:t>Heroku</a:t>
             </a:r>
           </a:p>
           <a:p>
@@ -8521,7 +9140,7 @@
                 <a:latin typeface="Arial" panose="020B0604020202020204" pitchFamily="34" charset="0"/>
                 <a:cs typeface="Arial" panose="020B0604020202020204" pitchFamily="34" charset="0"/>
               </a:rPr>
-              <a:t>B</a:t>
+              <a:t>API Integration</a:t>
             </a:r>
           </a:p>
           <a:p>
@@ -8531,25 +9150,23 @@
                 <a:latin typeface="Arial" panose="020B0604020202020204" pitchFamily="34" charset="0"/>
                 <a:cs typeface="Arial" panose="020B0604020202020204" pitchFamily="34" charset="0"/>
               </a:rPr>
-              <a:t>C</a:t>
+              <a:t>Front-end JS</a:t>
             </a:r>
           </a:p>
           <a:p>
             <a:pPr lvl="2"/>
-            <a:endParaRPr lang="en-US" dirty="0">
-              <a:latin typeface="Arial" panose="020B0604020202020204" pitchFamily="34" charset="0"/>
-              <a:cs typeface="Arial" panose="020B0604020202020204" pitchFamily="34" charset="0"/>
-            </a:endParaRPr>
-          </a:p>
-          <a:p>
-            <a:pPr lvl="1"/>
-            <a:endParaRPr lang="en-US" dirty="0">
-              <a:latin typeface="Arial" panose="020B0604020202020204" pitchFamily="34" charset="0"/>
-              <a:cs typeface="Arial" panose="020B0604020202020204" pitchFamily="34" charset="0"/>
-            </a:endParaRPr>
-          </a:p>
-          <a:p>
-            <a:pPr lvl="1"/>
+            <a:r>
+              <a:rPr lang="en-US" dirty="0">
+                <a:latin typeface="Arial" panose="020B0604020202020204" pitchFamily="34" charset="0"/>
+                <a:cs typeface="Arial" panose="020B0604020202020204" pitchFamily="34" charset="0"/>
+              </a:rPr>
+              <a:t>Pokémon love descriptions &amp; pitch</a:t>
+            </a:r>
+          </a:p>
+          <a:p>
+            <a:pPr marL="457200" lvl="1" indent="0">
+              <a:buNone/>
+            </a:pPr>
             <a:endParaRPr lang="en-US" dirty="0">
               <a:latin typeface="Arial" panose="020B0604020202020204" pitchFamily="34" charset="0"/>
               <a:cs typeface="Arial" panose="020B0604020202020204" pitchFamily="34" charset="0"/>
@@ -9040,7 +9657,7 @@
         <p:spPr>
           <a:xfrm>
             <a:off x="430306" y="1959424"/>
-            <a:ext cx="10923494" cy="3718771"/>
+            <a:ext cx="10923494" cy="4168240"/>
           </a:xfrm>
         </p:spPr>
         <p:txBody>
@@ -9067,7 +9684,7 @@
                 <a:latin typeface="Arial" panose="020B0604020202020204" pitchFamily="34" charset="0"/>
                 <a:cs typeface="Arial" panose="020B0604020202020204" pitchFamily="34" charset="0"/>
               </a:rPr>
-              <a:t>A</a:t>
+              <a:t>When merging files, small discrepancies in naming caused difficulties.</a:t>
             </a:r>
           </a:p>
           <a:p>
@@ -9077,7 +9694,7 @@
                 <a:latin typeface="Arial" panose="020B0604020202020204" pitchFamily="34" charset="0"/>
                 <a:cs typeface="Arial" panose="020B0604020202020204" pitchFamily="34" charset="0"/>
               </a:rPr>
-              <a:t>B</a:t>
+              <a:t>Heroku integration took some time to perfect.</a:t>
             </a:r>
           </a:p>
           <a:p>
@@ -9087,8 +9704,18 @@
                 <a:latin typeface="Arial" panose="020B0604020202020204" pitchFamily="34" charset="0"/>
                 <a:cs typeface="Arial" panose="020B0604020202020204" pitchFamily="34" charset="0"/>
               </a:rPr>
-              <a:t>C</a:t>
-            </a:r>
+              <a:t>Saving of names in a database to be viewed by other users presented issues.</a:t>
+            </a:r>
+            <a:br>
+              <a:rPr lang="en-US" dirty="0">
+                <a:latin typeface="Arial" panose="020B0604020202020204" pitchFamily="34" charset="0"/>
+                <a:cs typeface="Arial" panose="020B0604020202020204" pitchFamily="34" charset="0"/>
+              </a:rPr>
+            </a:br>
+            <a:endParaRPr lang="en-US" dirty="0">
+              <a:latin typeface="Arial" panose="020B0604020202020204" pitchFamily="34" charset="0"/>
+              <a:cs typeface="Arial" panose="020B0604020202020204" pitchFamily="34" charset="0"/>
+            </a:endParaRPr>
           </a:p>
           <a:p>
             <a:pPr marL="0" indent="0">
@@ -9109,7 +9736,7 @@
                 <a:latin typeface="Arial" panose="020B0604020202020204" pitchFamily="34" charset="0"/>
                 <a:cs typeface="Arial" panose="020B0604020202020204" pitchFamily="34" charset="0"/>
               </a:rPr>
-              <a:t>Visually appealing interface</a:t>
+              <a:t>Visually appealing interface.</a:t>
             </a:r>
           </a:p>
           <a:p>
@@ -9119,7 +9746,7 @@
                 <a:latin typeface="Arial" panose="020B0604020202020204" pitchFamily="34" charset="0"/>
                 <a:cs typeface="Arial" panose="020B0604020202020204" pitchFamily="34" charset="0"/>
               </a:rPr>
-              <a:t>Effective search functionality to achieve goals</a:t>
+              <a:t>Effective data functionality to achieve goals.</a:t>
             </a:r>
           </a:p>
           <a:p>
@@ -10324,7 +10951,7 @@
         </p:nvSpPr>
         <p:spPr>
           <a:xfrm>
-            <a:off x="320842" y="2031140"/>
+            <a:off x="320842" y="2247040"/>
             <a:ext cx="11032958" cy="4244154"/>
           </a:xfrm>
         </p:spPr>
@@ -10339,6 +10966,16 @@
               </a:rPr>
               <a:t>Link into Dating App tech to match with compatible people nearby.</a:t>
             </a:r>
+            <a:br>
+              <a:rPr lang="en-US" dirty="0">
+                <a:latin typeface="Arial" panose="020B0604020202020204" pitchFamily="34" charset="0"/>
+                <a:cs typeface="Arial" panose="020B0604020202020204" pitchFamily="34" charset="0"/>
+              </a:rPr>
+            </a:br>
+            <a:endParaRPr lang="en-US" dirty="0">
+              <a:latin typeface="Arial" panose="020B0604020202020204" pitchFamily="34" charset="0"/>
+              <a:cs typeface="Arial" panose="020B0604020202020204" pitchFamily="34" charset="0"/>
+            </a:endParaRPr>
           </a:p>
           <a:p>
             <a:r>
@@ -10348,15 +10985,16 @@
               </a:rPr>
               <a:t>User compares 2 potential matches by simulating Pokémon battle.</a:t>
             </a:r>
-          </a:p>
-          <a:p>
-            <a:r>
+            <a:br>
               <a:rPr lang="en-US" dirty="0">
                 <a:latin typeface="Arial" panose="020B0604020202020204" pitchFamily="34" charset="0"/>
                 <a:cs typeface="Arial" panose="020B0604020202020204" pitchFamily="34" charset="0"/>
               </a:rPr>
-              <a:t>A</a:t>
-            </a:r>
+            </a:br>
+            <a:endParaRPr lang="en-US" dirty="0">
+              <a:latin typeface="Arial" panose="020B0604020202020204" pitchFamily="34" charset="0"/>
+              <a:cs typeface="Arial" panose="020B0604020202020204" pitchFamily="34" charset="0"/>
+            </a:endParaRPr>
           </a:p>
           <a:p>
             <a:pPr marL="0" indent="0">
@@ -10367,12 +11005,30 @@
                 <a:latin typeface="Arial" panose="020B0604020202020204" pitchFamily="34" charset="0"/>
                 <a:cs typeface="Arial" panose="020B0604020202020204" pitchFamily="34" charset="0"/>
               </a:rPr>
-              <a:t>               • B</a:t>
-            </a:r>
-            <a:endParaRPr lang="en-AU" dirty="0">
+              <a:t>                 • Links to sellers of Pokémon merchandise following 			result, could generate revenue.</a:t>
+            </a:r>
+            <a:br>
+              <a:rPr lang="en-US" dirty="0">
+                <a:latin typeface="Arial" panose="020B0604020202020204" pitchFamily="34" charset="0"/>
+                <a:cs typeface="Arial" panose="020B0604020202020204" pitchFamily="34" charset="0"/>
+              </a:rPr>
+            </a:br>
+            <a:endParaRPr lang="en-US" dirty="0">
               <a:latin typeface="Arial" panose="020B0604020202020204" pitchFamily="34" charset="0"/>
               <a:cs typeface="Arial" panose="020B0604020202020204" pitchFamily="34" charset="0"/>
             </a:endParaRPr>
+          </a:p>
+          <a:p>
+            <a:pPr marL="0" indent="0">
+              <a:buNone/>
+            </a:pPr>
+            <a:r>
+              <a:rPr lang="en-US" dirty="0">
+                <a:latin typeface="Arial" panose="020B0604020202020204" pitchFamily="34" charset="0"/>
+                <a:cs typeface="Arial" panose="020B0604020202020204" pitchFamily="34" charset="0"/>
+              </a:rPr>
+              <a:t>		 •  • Permission could be sought from Nintendo to make 		     the app generate revenue through the above</a:t>
+            </a:r>
           </a:p>
         </p:txBody>
       </p:sp>

</xml_diff>